<commit_message>
slides: update on the basics to include eager execution
</commit_message>
<xml_diff>
--- a/slides/flink_batch_basics.pptx
+++ b/slides/flink_batch_basics.pptx
@@ -5,7 +5,7 @@
     <p:sldMasterId id="2147483660" r:id="rId1"/>
   </p:sldMasterIdLst>
   <p:notesMasterIdLst>
-    <p:notesMasterId r:id="rId28"/>
+    <p:notesMasterId r:id="rId29"/>
   </p:notesMasterIdLst>
   <p:sldIdLst>
     <p:sldId id="258" r:id="rId2"/>
@@ -32,8 +32,9 @@
     <p:sldId id="268" r:id="rId23"/>
     <p:sldId id="285" r:id="rId24"/>
     <p:sldId id="287" r:id="rId25"/>
-    <p:sldId id="269" r:id="rId26"/>
-    <p:sldId id="270" r:id="rId27"/>
+    <p:sldId id="288" r:id="rId26"/>
+    <p:sldId id="269" r:id="rId27"/>
+    <p:sldId id="270" r:id="rId28"/>
   </p:sldIdLst>
   <p:sldSz cx="9144000" cy="6858000" type="screen4x3"/>
   <p:notesSz cx="6858000" cy="9144000"/>
@@ -134,7 +135,7 @@
   </p:defaultTextStyle>
   <p:extLst>
     <p:ext uri="{EFAFB233-063F-42B5-8137-9DF3F51BA10A}">
-      <p15:sldGuideLst xmlns="" xmlns:p15="http://schemas.microsoft.com/office/powerpoint/2012/main">
+      <p15:sldGuideLst xmlns:p15="http://schemas.microsoft.com/office/powerpoint/2012/main" xmlns="">
         <p15:guide id="1" orient="horz" pos="2160">
           <p15:clr>
             <a:srgbClr val="A4A3A4"/>
@@ -233,7 +234,7 @@
           <a:p>
             <a:fld id="{F01141F9-3E73-7448-86C2-E96D93FE379F}" type="datetimeFigureOut">
               <a:rPr lang="en-US" smtClean="0"/>
-              <a:t>29/05/15</a:t>
+              <a:t>01/06/15</a:t>
             </a:fld>
             <a:endParaRPr lang="en-US"/>
           </a:p>
@@ -5218,11 +5219,11 @@
   <p:clrMapOvr>
     <a:masterClrMapping/>
   </p:clrMapOvr>
-  <mc:AlternateContent xmlns:mc="http://schemas.openxmlformats.org/markup-compatibility/2006">
-    <mc:Choice xmlns:p14="http://schemas.microsoft.com/office/powerpoint/2010/main" Requires="p14">
+  <mc:AlternateContent xmlns:mc="http://schemas.openxmlformats.org/markup-compatibility/2006" xmlns:p14="http://schemas.microsoft.com/office/powerpoint/2010/main">
+    <mc:Choice Requires="p14">
       <p:transition spd="slow" p14:dur="2000"/>
     </mc:Choice>
-    <mc:Fallback>
+    <mc:Fallback xmlns="">
       <p:transition xmlns:p14="http://schemas.microsoft.com/office/powerpoint/2010/main" spd="slow"/>
     </mc:Fallback>
   </mc:AlternateContent>
@@ -5810,11 +5811,11 @@
   <p:clrMapOvr>
     <a:masterClrMapping/>
   </p:clrMapOvr>
-  <mc:AlternateContent xmlns:mc="http://schemas.openxmlformats.org/markup-compatibility/2006">
-    <mc:Choice xmlns:p14="http://schemas.microsoft.com/office/powerpoint/2010/main" Requires="p14">
+  <mc:AlternateContent xmlns:mc="http://schemas.openxmlformats.org/markup-compatibility/2006" xmlns:p14="http://schemas.microsoft.com/office/powerpoint/2010/main">
+    <mc:Choice Requires="p14">
       <p:transition spd="slow" p14:dur="2000"/>
     </mc:Choice>
-    <mc:Fallback>
+    <mc:Fallback xmlns="">
       <p:transition xmlns:p14="http://schemas.microsoft.com/office/powerpoint/2010/main" spd="slow"/>
     </mc:Fallback>
   </mc:AlternateContent>
@@ -9554,10 +9555,6 @@
               </a:rPr>
               <a:t>)</a:t>
             </a:r>
-            <a:endParaRPr lang="en-US" dirty="0" smtClean="0">
-              <a:latin typeface="Menlo Regular"/>
-              <a:cs typeface="Menlo Regular"/>
-            </a:endParaRPr>
           </a:p>
           <a:p>
             <a:pPr marL="0" indent="0">
@@ -9586,10 +9583,6 @@
               </a:rPr>
               <a:t>(“/path/to/file”)</a:t>
             </a:r>
-            <a:endParaRPr lang="en-US" dirty="0" smtClean="0">
-              <a:latin typeface="Menlo Regular"/>
-              <a:cs typeface="Menlo Regular"/>
-            </a:endParaRPr>
           </a:p>
           <a:p>
             <a:pPr marL="0" indent="0">
@@ -9687,11 +9680,11 @@
   <p:clrMapOvr>
     <a:masterClrMapping/>
   </p:clrMapOvr>
-  <mc:AlternateContent xmlns:mc="http://schemas.openxmlformats.org/markup-compatibility/2006">
-    <mc:Choice xmlns:p14="http://schemas.microsoft.com/office/powerpoint/2010/main" Requires="p14">
+  <mc:AlternateContent xmlns:mc="http://schemas.openxmlformats.org/markup-compatibility/2006" xmlns:p14="http://schemas.microsoft.com/office/powerpoint/2010/main">
+    <mc:Choice Requires="p14">
       <p:transition spd="slow" p14:dur="2000"/>
     </mc:Choice>
-    <mc:Fallback>
+    <mc:Fallback xmlns="">
       <p:transition xmlns:p14="http://schemas.microsoft.com/office/powerpoint/2010/main" spd="slow"/>
     </mc:Fallback>
   </mc:AlternateContent>
@@ -10828,11 +10821,11 @@
   <p:clrMapOvr>
     <a:masterClrMapping/>
   </p:clrMapOvr>
-  <mc:AlternateContent xmlns:mc="http://schemas.openxmlformats.org/markup-compatibility/2006">
-    <mc:Choice xmlns:p14="http://schemas.microsoft.com/office/powerpoint/2010/main" Requires="p14">
+  <mc:AlternateContent xmlns:mc="http://schemas.openxmlformats.org/markup-compatibility/2006" xmlns:p14="http://schemas.microsoft.com/office/powerpoint/2010/main">
+    <mc:Choice Requires="p14">
       <p:transition spd="slow" p14:dur="2000"/>
     </mc:Choice>
-    <mc:Fallback>
+    <mc:Fallback xmlns="">
       <p:transition xmlns:p14="http://schemas.microsoft.com/office/powerpoint/2010/main" spd="slow"/>
     </mc:Fallback>
   </mc:AlternateContent>
@@ -11093,7 +11086,7 @@
         <p:spPr/>
         <p:txBody>
           <a:bodyPr>
-            <a:normAutofit fontScale="92500" lnSpcReduction="20000"/>
+            <a:normAutofit fontScale="85000" lnSpcReduction="20000"/>
           </a:bodyPr>
           <a:lstStyle/>
           <a:p>
@@ -11140,11 +11133,32 @@
               <a:t>writeAsFormattedText</a:t>
             </a:r>
             <a:r>
+              <a:rPr lang="en-US" dirty="0">
+                <a:latin typeface="Menlo Regular"/>
+                <a:cs typeface="Menlo Regular"/>
+              </a:rPr>
+              <a:t>(“/path/to/file</a:t>
+            </a:r>
+            <a:r>
               <a:rPr lang="en-US" dirty="0" smtClean="0">
                 <a:latin typeface="Menlo Regular"/>
                 <a:cs typeface="Menlo Regular"/>
               </a:rPr>
-              <a:t>()</a:t>
+              <a:t>”, </a:t>
+            </a:r>
+            <a:r>
+              <a:rPr lang="en-US" dirty="0" err="1" smtClean="0">
+                <a:latin typeface="Menlo Regular"/>
+                <a:cs typeface="Menlo Regular"/>
+              </a:rPr>
+              <a:t>formatFunction</a:t>
+            </a:r>
+            <a:r>
+              <a:rPr lang="en-US" dirty="0" smtClean="0">
+                <a:latin typeface="Menlo Regular"/>
+                <a:cs typeface="Menlo Regular"/>
+              </a:rPr>
+              <a:t>)</a:t>
             </a:r>
             <a:endParaRPr lang="en-US" dirty="0" smtClean="0">
               <a:latin typeface="Menlo Regular"/>
@@ -11219,28 +11233,17 @@
                 <a:latin typeface="Menlo Regular"/>
                 <a:cs typeface="Menlo Regular"/>
               </a:rPr>
-              <a:t>Collect(</a:t>
-            </a:r>
+              <a:t>Collect()</a:t>
+            </a:r>
+          </a:p>
+          <a:p>
             <a:r>
               <a:rPr lang="en-US" dirty="0">
                 <a:latin typeface="Menlo Regular"/>
                 <a:cs typeface="Menlo Regular"/>
               </a:rPr>
-              <a:t>)</a:t>
-            </a:r>
-          </a:p>
-          <a:p>
-            <a:r>
-              <a:rPr lang="en-US" dirty="0">
-                <a:latin typeface="Menlo Regular"/>
-                <a:cs typeface="Menlo Regular"/>
-              </a:rPr>
               <a:t>Count()</a:t>
             </a:r>
-            <a:endParaRPr lang="en-US" dirty="0">
-              <a:latin typeface="Menlo Regular"/>
-              <a:cs typeface="Menlo Regular"/>
-            </a:endParaRPr>
           </a:p>
         </p:txBody>
       </p:sp>
@@ -11290,11 +11293,11 @@
   <p:clrMapOvr>
     <a:masterClrMapping/>
   </p:clrMapOvr>
-  <mc:AlternateContent xmlns:mc="http://schemas.openxmlformats.org/markup-compatibility/2006">
-    <mc:Choice xmlns:p14="http://schemas.microsoft.com/office/powerpoint/2010/main" Requires="p14">
+  <mc:AlternateContent xmlns:mc="http://schemas.openxmlformats.org/markup-compatibility/2006" xmlns:p14="http://schemas.microsoft.com/office/powerpoint/2010/main">
+    <mc:Choice Requires="p14">
       <p:transition spd="slow" p14:dur="2000"/>
     </mc:Choice>
-    <mc:Fallback>
+    <mc:Fallback xmlns="">
       <p:transition xmlns:p14="http://schemas.microsoft.com/office/powerpoint/2010/main" spd="slow"/>
     </mc:Fallback>
   </mc:AlternateContent>
@@ -11361,20 +11364,50 @@
         <p:spPr>
           <a:xfrm>
             <a:off x="328593" y="1474376"/>
-            <a:ext cx="8445740" cy="4651788"/>
+            <a:ext cx="8445740" cy="4881974"/>
           </a:xfrm>
         </p:spPr>
         <p:txBody>
           <a:bodyPr>
-            <a:normAutofit lnSpcReduction="10000"/>
+            <a:normAutofit fontScale="92500" lnSpcReduction="20000"/>
           </a:bodyPr>
           <a:lstStyle/>
           <a:p>
+            <a:r>
+              <a:rPr lang="en-US" sz="2600" dirty="0" smtClean="0">
+                <a:solidFill>
+                  <a:srgbClr val="000000"/>
+                </a:solidFill>
+                <a:latin typeface="Avenir Book"/>
+                <a:cs typeface="Avenir Book"/>
+              </a:rPr>
+              <a:t>Lazily executed</a:t>
+            </a:r>
+            <a:endParaRPr lang="en-US" sz="2600" dirty="0">
+              <a:solidFill>
+                <a:srgbClr val="000000"/>
+              </a:solidFill>
+              <a:latin typeface="Avenir Book"/>
+              <a:cs typeface="Avenir Book"/>
+            </a:endParaRPr>
+          </a:p>
+          <a:p>
             <a:pPr marL="0" indent="0">
               <a:buNone/>
             </a:pPr>
-            <a:r>
-              <a:rPr lang="en-US" sz="1600" dirty="0" err="1">
+            <a:endParaRPr lang="en-US" sz="1600" dirty="0" smtClean="0">
+              <a:solidFill>
+                <a:srgbClr val="000000"/>
+              </a:solidFill>
+              <a:latin typeface="Menlo"/>
+            </a:endParaRPr>
+          </a:p>
+          <a:p>
+            <a:pPr marL="0" indent="0">
+              <a:buNone/>
+            </a:pPr>
+            <a:r>
+              <a:rPr lang="en-US" sz="1600" dirty="0" err="1" smtClean="0">
                 <a:solidFill>
                   <a:srgbClr val="000000"/>
                 </a:solidFill>
@@ -12142,16 +12175,31 @@
                 </a:solidFill>
                 <a:latin typeface="Menlo"/>
               </a:rPr>
-              <a:t>		});</a:t>
-            </a:r>
-          </a:p>
-          <a:p>
-            <a:pPr marL="0" indent="0">
-              <a:buNone/>
-            </a:pPr>
-            <a:endParaRPr lang="en-US" sz="1600" dirty="0">
-              <a:latin typeface="Menlo Regular"/>
-              <a:cs typeface="Menlo Regular"/>
+              <a:t>		}</a:t>
+            </a:r>
+            <a:r>
+              <a:rPr lang="en-US" sz="1600" dirty="0" smtClean="0">
+                <a:solidFill>
+                  <a:srgbClr val="000000"/>
+                </a:solidFill>
+                <a:latin typeface="Menlo"/>
+              </a:rPr>
+              <a:t>)</a:t>
+            </a:r>
+            <a:r>
+              <a:rPr lang="en-US" sz="1600" dirty="0">
+                <a:solidFill>
+                  <a:srgbClr val="000000"/>
+                </a:solidFill>
+                <a:latin typeface="Menlo"/>
+              </a:rPr>
+              <a:t>;</a:t>
+            </a:r>
+            <a:endParaRPr lang="en-US" sz="1600" dirty="0" smtClean="0">
+              <a:solidFill>
+                <a:srgbClr val="000000"/>
+              </a:solidFill>
+              <a:latin typeface="Menlo"/>
             </a:endParaRPr>
           </a:p>
         </p:txBody>
@@ -12202,11 +12250,11 @@
   <p:clrMapOvr>
     <a:masterClrMapping/>
   </p:clrMapOvr>
-  <mc:AlternateContent xmlns:mc="http://schemas.openxmlformats.org/markup-compatibility/2006">
-    <mc:Choice xmlns:p14="http://schemas.microsoft.com/office/powerpoint/2010/main" Requires="p14">
+  <mc:AlternateContent xmlns:mc="http://schemas.openxmlformats.org/markup-compatibility/2006" xmlns:p14="http://schemas.microsoft.com/office/powerpoint/2010/main">
+    <mc:Choice Requires="p14">
       <p:transition spd="slow" p14:dur="2000"/>
     </mc:Choice>
-    <mc:Fallback>
+    <mc:Fallback xmlns="">
       <p:transition xmlns:p14="http://schemas.microsoft.com/office/powerpoint/2010/main" spd="slow"/>
     </mc:Fallback>
   </mc:AlternateContent>
@@ -12239,6 +12287,486 @@
       </p:grpSpPr>
       <p:sp>
         <p:nvSpPr>
+          <p:cNvPr id="2" name="Title 1"/>
+          <p:cNvSpPr>
+            <a:spLocks noGrp="1"/>
+          </p:cNvSpPr>
+          <p:nvPr>
+            <p:ph type="title"/>
+          </p:nvPr>
+        </p:nvSpPr>
+        <p:spPr/>
+        <p:txBody>
+          <a:bodyPr/>
+          <a:lstStyle/>
+          <a:p>
+            <a:r>
+              <a:rPr lang="en-US" dirty="0" smtClean="0"/>
+              <a:t>Data Sinks</a:t>
+            </a:r>
+            <a:endParaRPr lang="en-US" dirty="0"/>
+          </a:p>
+        </p:txBody>
+      </p:sp>
+      <p:sp>
+        <p:nvSpPr>
+          <p:cNvPr id="3" name="Content Placeholder 2"/>
+          <p:cNvSpPr>
+            <a:spLocks noGrp="1"/>
+          </p:cNvSpPr>
+          <p:nvPr>
+            <p:ph idx="1"/>
+          </p:nvPr>
+        </p:nvSpPr>
+        <p:spPr>
+          <a:xfrm>
+            <a:off x="328592" y="1474376"/>
+            <a:ext cx="8524551" cy="4651788"/>
+          </a:xfrm>
+        </p:spPr>
+        <p:txBody>
+          <a:bodyPr>
+            <a:normAutofit/>
+          </a:bodyPr>
+          <a:lstStyle/>
+          <a:p>
+            <a:r>
+              <a:rPr lang="en-US" sz="2400" dirty="0" smtClean="0">
+                <a:solidFill>
+                  <a:srgbClr val="000000"/>
+                </a:solidFill>
+                <a:latin typeface="Avenir Book"/>
+                <a:cs typeface="Avenir Book"/>
+              </a:rPr>
+              <a:t>Eagerly executed</a:t>
+            </a:r>
+          </a:p>
+          <a:p>
+            <a:pPr marL="0" indent="0">
+              <a:buNone/>
+            </a:pPr>
+            <a:endParaRPr lang="en-US" sz="1600" dirty="0">
+              <a:solidFill>
+                <a:srgbClr val="000000"/>
+              </a:solidFill>
+              <a:latin typeface="Menlo"/>
+            </a:endParaRPr>
+          </a:p>
+          <a:p>
+            <a:pPr marL="0" indent="0">
+              <a:buNone/>
+            </a:pPr>
+            <a:r>
+              <a:rPr lang="en-US" sz="1600" dirty="0" err="1" smtClean="0">
+                <a:solidFill>
+                  <a:srgbClr val="000000"/>
+                </a:solidFill>
+                <a:latin typeface="Menlo"/>
+              </a:rPr>
+              <a:t>DataSet</a:t>
+            </a:r>
+            <a:r>
+              <a:rPr lang="en-US" sz="1600" dirty="0" smtClean="0">
+                <a:solidFill>
+                  <a:srgbClr val="000000"/>
+                </a:solidFill>
+                <a:latin typeface="Menlo"/>
+              </a:rPr>
+              <a:t>&lt;Tuple2&lt;String, Integer</a:t>
+            </a:r>
+            <a:r>
+              <a:rPr lang="en-US" sz="1600" dirty="0" smtClean="0">
+                <a:solidFill>
+                  <a:srgbClr val="000000"/>
+                </a:solidFill>
+                <a:latin typeface="Menlo"/>
+              </a:rPr>
+              <a:t>&gt; </a:t>
+            </a:r>
+            <a:r>
+              <a:rPr lang="en-US" sz="1600" dirty="0">
+                <a:solidFill>
+                  <a:srgbClr val="000000"/>
+                </a:solidFill>
+                <a:latin typeface="Menlo"/>
+              </a:rPr>
+              <a:t>result;</a:t>
+            </a:r>
+          </a:p>
+          <a:p>
+            <a:pPr marL="0" indent="0">
+              <a:buNone/>
+            </a:pPr>
+            <a:endParaRPr lang="en-US" sz="1600" i="1" dirty="0" smtClean="0">
+              <a:solidFill>
+                <a:srgbClr val="808080"/>
+              </a:solidFill>
+              <a:latin typeface="Menlo"/>
+            </a:endParaRPr>
+          </a:p>
+          <a:p>
+            <a:pPr marL="0" indent="0">
+              <a:buNone/>
+            </a:pPr>
+            <a:endParaRPr lang="en-US" sz="1600" i="1" dirty="0" smtClean="0">
+              <a:solidFill>
+                <a:srgbClr val="808080"/>
+              </a:solidFill>
+              <a:latin typeface="Menlo"/>
+            </a:endParaRPr>
+          </a:p>
+          <a:p>
+            <a:pPr marL="0" indent="0">
+              <a:buNone/>
+            </a:pPr>
+            <a:r>
+              <a:rPr lang="en-US" sz="1600" i="1" dirty="0">
+                <a:solidFill>
+                  <a:srgbClr val="808080"/>
+                </a:solidFill>
+                <a:latin typeface="Menlo"/>
+              </a:rPr>
+              <a:t>// </a:t>
+            </a:r>
+            <a:r>
+              <a:rPr lang="en-US" sz="1600" i="1" dirty="0" smtClean="0">
+                <a:solidFill>
+                  <a:srgbClr val="808080"/>
+                </a:solidFill>
+                <a:latin typeface="Menlo"/>
+              </a:rPr>
+              <a:t>print</a:t>
+            </a:r>
+          </a:p>
+          <a:p>
+            <a:pPr marL="0" indent="0">
+              <a:buNone/>
+            </a:pPr>
+            <a:r>
+              <a:rPr lang="en-US" sz="1600" dirty="0" err="1">
+                <a:solidFill>
+                  <a:srgbClr val="000000"/>
+                </a:solidFill>
+                <a:latin typeface="Menlo"/>
+              </a:rPr>
+              <a:t>r</a:t>
+            </a:r>
+            <a:r>
+              <a:rPr lang="en-US" sz="1600" dirty="0" err="1" smtClean="0">
+                <a:solidFill>
+                  <a:srgbClr val="000000"/>
+                </a:solidFill>
+                <a:latin typeface="Menlo"/>
+              </a:rPr>
+              <a:t>esult.print</a:t>
+            </a:r>
+            <a:r>
+              <a:rPr lang="en-US" sz="1600" dirty="0" smtClean="0">
+                <a:solidFill>
+                  <a:srgbClr val="000000"/>
+                </a:solidFill>
+                <a:latin typeface="Menlo"/>
+              </a:rPr>
+              <a:t>(</a:t>
+            </a:r>
+            <a:r>
+              <a:rPr lang="en-US" sz="1600" dirty="0">
+                <a:solidFill>
+                  <a:srgbClr val="000000"/>
+                </a:solidFill>
+                <a:latin typeface="Menlo"/>
+              </a:rPr>
+              <a:t>)</a:t>
+            </a:r>
+            <a:r>
+              <a:rPr lang="en-US" sz="1600" dirty="0" smtClean="0">
+                <a:solidFill>
+                  <a:srgbClr val="000000"/>
+                </a:solidFill>
+                <a:latin typeface="Menlo"/>
+              </a:rPr>
+              <a:t>;</a:t>
+            </a:r>
+            <a:endParaRPr lang="en-US" sz="1600" i="1" dirty="0" smtClean="0">
+              <a:solidFill>
+                <a:srgbClr val="808080"/>
+              </a:solidFill>
+              <a:latin typeface="Menlo"/>
+            </a:endParaRPr>
+          </a:p>
+          <a:p>
+            <a:pPr marL="0" indent="0">
+              <a:buNone/>
+            </a:pPr>
+            <a:endParaRPr lang="en-US" sz="1600" i="1" dirty="0" smtClean="0">
+              <a:solidFill>
+                <a:srgbClr val="808080"/>
+              </a:solidFill>
+              <a:latin typeface="Menlo"/>
+            </a:endParaRPr>
+          </a:p>
+          <a:p>
+            <a:pPr marL="0" indent="0">
+              <a:buNone/>
+            </a:pPr>
+            <a:r>
+              <a:rPr lang="en-US" sz="1600" i="1" dirty="0" smtClean="0">
+                <a:solidFill>
+                  <a:srgbClr val="808080"/>
+                </a:solidFill>
+                <a:latin typeface="Menlo"/>
+              </a:rPr>
+              <a:t>// count</a:t>
+            </a:r>
+            <a:endParaRPr lang="en-US" sz="1600" i="1" dirty="0" smtClean="0">
+              <a:solidFill>
+                <a:srgbClr val="808080"/>
+              </a:solidFill>
+              <a:latin typeface="Menlo"/>
+            </a:endParaRPr>
+          </a:p>
+          <a:p>
+            <a:pPr marL="0" indent="0">
+              <a:buNone/>
+            </a:pPr>
+            <a:r>
+              <a:rPr lang="en-US" sz="1600" b="1" dirty="0" err="1">
+                <a:solidFill>
+                  <a:srgbClr val="000080"/>
+                </a:solidFill>
+                <a:latin typeface="Menlo"/>
+              </a:rPr>
+              <a:t>int</a:t>
+            </a:r>
+            <a:r>
+              <a:rPr lang="en-US" sz="1600" b="1" dirty="0">
+                <a:solidFill>
+                  <a:srgbClr val="000080"/>
+                </a:solidFill>
+                <a:latin typeface="Menlo"/>
+              </a:rPr>
+              <a:t> </a:t>
+            </a:r>
+            <a:r>
+              <a:rPr lang="en-US" sz="1600" dirty="0" err="1">
+                <a:solidFill>
+                  <a:srgbClr val="000000"/>
+                </a:solidFill>
+                <a:latin typeface="Menlo"/>
+              </a:rPr>
+              <a:t>numberOfElements</a:t>
+            </a:r>
+            <a:r>
+              <a:rPr lang="en-US" sz="1600" dirty="0">
+                <a:solidFill>
+                  <a:srgbClr val="000000"/>
+                </a:solidFill>
+                <a:latin typeface="Menlo"/>
+              </a:rPr>
+              <a:t> = </a:t>
+            </a:r>
+            <a:r>
+              <a:rPr lang="en-US" sz="1600" dirty="0" err="1">
+                <a:solidFill>
+                  <a:srgbClr val="000000"/>
+                </a:solidFill>
+                <a:latin typeface="Menlo"/>
+              </a:rPr>
+              <a:t>result.count</a:t>
+            </a:r>
+            <a:r>
+              <a:rPr lang="en-US" sz="1600" dirty="0">
+                <a:solidFill>
+                  <a:srgbClr val="000000"/>
+                </a:solidFill>
+                <a:latin typeface="Menlo"/>
+              </a:rPr>
+              <a:t>()</a:t>
+            </a:r>
+            <a:r>
+              <a:rPr lang="en-US" sz="1600" dirty="0" smtClean="0">
+                <a:solidFill>
+                  <a:srgbClr val="000000"/>
+                </a:solidFill>
+                <a:latin typeface="Menlo"/>
+              </a:rPr>
+              <a:t>;</a:t>
+            </a:r>
+          </a:p>
+          <a:p>
+            <a:pPr marL="0" indent="0">
+              <a:buNone/>
+            </a:pPr>
+            <a:endParaRPr lang="en-US" sz="1600" dirty="0" smtClean="0">
+              <a:latin typeface="Menlo Regular"/>
+              <a:cs typeface="Menlo Regular"/>
+            </a:endParaRPr>
+          </a:p>
+          <a:p>
+            <a:pPr marL="0" indent="0">
+              <a:buNone/>
+            </a:pPr>
+            <a:r>
+              <a:rPr lang="en-US" sz="1600" i="1" dirty="0">
+                <a:solidFill>
+                  <a:srgbClr val="808080"/>
+                </a:solidFill>
+                <a:latin typeface="Menlo"/>
+              </a:rPr>
+              <a:t>// </a:t>
+            </a:r>
+            <a:r>
+              <a:rPr lang="en-US" sz="1600" i="1" dirty="0" smtClean="0">
+                <a:solidFill>
+                  <a:srgbClr val="808080"/>
+                </a:solidFill>
+                <a:latin typeface="Menlo"/>
+              </a:rPr>
+              <a:t>collect</a:t>
+            </a:r>
+            <a:endParaRPr lang="en-US" sz="1600" i="1" dirty="0">
+              <a:solidFill>
+                <a:srgbClr val="808080"/>
+              </a:solidFill>
+              <a:latin typeface="Menlo"/>
+            </a:endParaRPr>
+          </a:p>
+          <a:p>
+            <a:pPr marL="0" indent="0">
+              <a:buNone/>
+            </a:pPr>
+            <a:r>
+              <a:rPr lang="en-US" sz="1600" dirty="0" smtClean="0">
+                <a:latin typeface="Menlo Regular"/>
+                <a:cs typeface="Menlo Regular"/>
+              </a:rPr>
+              <a:t>List&lt;Tuple2&lt;String, </a:t>
+            </a:r>
+            <a:r>
+              <a:rPr lang="en-US" sz="1600" dirty="0" smtClean="0">
+                <a:latin typeface="Menlo Regular"/>
+                <a:cs typeface="Menlo Regular"/>
+              </a:rPr>
+              <a:t>Integer&gt; </a:t>
+            </a:r>
+            <a:r>
+              <a:rPr lang="en-US" sz="1600" dirty="0" err="1" smtClean="0">
+                <a:latin typeface="Menlo Regular"/>
+                <a:cs typeface="Menlo Regular"/>
+              </a:rPr>
+              <a:t>materializedResults</a:t>
+            </a:r>
+            <a:r>
+              <a:rPr lang="en-US" sz="1600" dirty="0" smtClean="0">
+                <a:latin typeface="Menlo Regular"/>
+                <a:cs typeface="Menlo Regular"/>
+              </a:rPr>
+              <a:t> = </a:t>
+            </a:r>
+            <a:r>
+              <a:rPr lang="en-US" sz="1600" dirty="0" err="1" smtClean="0">
+                <a:latin typeface="Menlo Regular"/>
+                <a:cs typeface="Menlo Regular"/>
+              </a:rPr>
+              <a:t>result.collect</a:t>
+            </a:r>
+            <a:r>
+              <a:rPr lang="en-US" sz="1600" dirty="0" smtClean="0">
+                <a:latin typeface="Menlo Regular"/>
+                <a:cs typeface="Menlo Regular"/>
+              </a:rPr>
+              <a:t>();</a:t>
+            </a:r>
+            <a:endParaRPr lang="en-US" sz="1600" dirty="0">
+              <a:latin typeface="Menlo Regular"/>
+              <a:cs typeface="Menlo Regular"/>
+            </a:endParaRPr>
+          </a:p>
+        </p:txBody>
+      </p:sp>
+      <p:sp>
+        <p:nvSpPr>
+          <p:cNvPr id="4" name="Slide Number Placeholder 3"/>
+          <p:cNvSpPr>
+            <a:spLocks noGrp="1"/>
+          </p:cNvSpPr>
+          <p:nvPr>
+            <p:ph type="sldNum" sz="quarter" idx="12"/>
+          </p:nvPr>
+        </p:nvSpPr>
+        <p:spPr/>
+        <p:txBody>
+          <a:bodyPr/>
+          <a:lstStyle/>
+          <a:p>
+            <a:fld id="{B07C5D84-2227-C144-B485-A8CA33CE4230}" type="slidenum">
+              <a:rPr lang="en-US" smtClean="0">
+                <a:solidFill>
+                  <a:prstClr val="black">
+                    <a:tint val="75000"/>
+                  </a:prstClr>
+                </a:solidFill>
+              </a:rPr>
+              <a:pPr/>
+              <a:t>25</a:t>
+            </a:fld>
+            <a:endParaRPr lang="en-US">
+              <a:solidFill>
+                <a:prstClr val="black">
+                  <a:tint val="75000"/>
+                </a:prstClr>
+              </a:solidFill>
+            </a:endParaRPr>
+          </a:p>
+        </p:txBody>
+      </p:sp>
+    </p:spTree>
+    <p:extLst>
+      <p:ext uri="{BB962C8B-B14F-4D97-AF65-F5344CB8AC3E}">
+        <p14:creationId xmlns:p14="http://schemas.microsoft.com/office/powerpoint/2010/main" val="1182419852"/>
+      </p:ext>
+    </p:extLst>
+  </p:cSld>
+  <p:clrMapOvr>
+    <a:masterClrMapping/>
+  </p:clrMapOvr>
+  <mc:AlternateContent xmlns:mc="http://schemas.openxmlformats.org/markup-compatibility/2006" xmlns:p14="http://schemas.microsoft.com/office/powerpoint/2010/main">
+    <mc:Choice Requires="p14">
+      <p:transition spd="slow" p14:dur="2000"/>
+    </mc:Choice>
+    <mc:Fallback xmlns="">
+      <p:transition xmlns:p14="http://schemas.microsoft.com/office/powerpoint/2010/main" spd="slow"/>
+    </mc:Fallback>
+  </mc:AlternateContent>
+  <p:timing>
+    <p:tnLst>
+      <p:par>
+        <p:cTn xmlns:p14="http://schemas.microsoft.com/office/powerpoint/2010/main" id="1" dur="indefinite" restart="never" nodeType="tmRoot"/>
+      </p:par>
+    </p:tnLst>
+  </p:timing>
+</p:sld>
+</file>
+
+<file path=ppt/slides/slide26.xml><?xml version="1.0" encoding="utf-8"?>
+<p:sld xmlns:a="http://schemas.openxmlformats.org/drawingml/2006/main" xmlns:r="http://schemas.openxmlformats.org/officeDocument/2006/relationships" xmlns:p="http://schemas.openxmlformats.org/presentationml/2006/main">
+  <p:cSld>
+    <p:spTree>
+      <p:nvGrpSpPr>
+        <p:cNvPr id="1" name=""/>
+        <p:cNvGrpSpPr/>
+        <p:nvPr/>
+      </p:nvGrpSpPr>
+      <p:grpSpPr>
+        <a:xfrm>
+          <a:off x="0" y="0"/>
+          <a:ext cx="0" cy="0"/>
+          <a:chOff x="0" y="0"/>
+          <a:chExt cx="0" cy="0"/>
+        </a:xfrm>
+      </p:grpSpPr>
+      <p:sp>
+        <p:nvSpPr>
           <p:cNvPr id="5" name="Title 4"/>
           <p:cNvSpPr>
             <a:spLocks noGrp="1"/>
@@ -12303,7 +12831,7 @@
                 </a:solidFill>
               </a:rPr>
               <a:pPr/>
-              <a:t>25</a:t>
+              <a:t>26</a:t>
             </a:fld>
             <a:endParaRPr lang="en-US">
               <a:solidFill>
@@ -12325,6 +12853,14 @@
   <p:clrMapOvr>
     <a:masterClrMapping/>
   </p:clrMapOvr>
+  <mc:AlternateContent xmlns:mc="http://schemas.openxmlformats.org/markup-compatibility/2006">
+    <mc:Choice xmlns:p14="http://schemas.microsoft.com/office/powerpoint/2010/main" Requires="p14">
+      <p:transition spd="slow" p14:dur="2000"/>
+    </mc:Choice>
+    <mc:Fallback>
+      <p:transition xmlns:p14="http://schemas.microsoft.com/office/powerpoint/2010/main" spd="slow"/>
+    </mc:Fallback>
+  </mc:AlternateContent>
   <p:timing>
     <p:tnLst>
       <p:par>
@@ -12335,7 +12871,7 @@
 </p:sld>
 </file>
 
-<file path=ppt/slides/slide26.xml><?xml version="1.0" encoding="utf-8"?>
+<file path=ppt/slides/slide27.xml><?xml version="1.0" encoding="utf-8"?>
 <p:sld xmlns:a="http://schemas.openxmlformats.org/drawingml/2006/main" xmlns:r="http://schemas.openxmlformats.org/officeDocument/2006/relationships" xmlns:p="http://schemas.openxmlformats.org/presentationml/2006/main" show="0">
   <p:cSld>
     <p:spTree>
@@ -12429,7 +12965,7 @@
             <a:fld id="{B07C5D84-2227-C144-B485-A8CA33CE4230}" type="slidenum">
               <a:rPr lang="en-US" smtClean="0"/>
               <a:pPr/>
-              <a:t>26</a:t>
+              <a:t>27</a:t>
             </a:fld>
             <a:endParaRPr lang="en-US"/>
           </a:p>
@@ -15441,12 +15977,6 @@
               </a:rPr>
               <a:t>}</a:t>
             </a:r>
-            <a:endParaRPr lang="en-US" sz="1800" dirty="0">
-              <a:solidFill>
-                <a:srgbClr val="000000"/>
-              </a:solidFill>
-              <a:latin typeface="Menlo"/>
-            </a:endParaRPr>
           </a:p>
         </p:txBody>
       </p:sp>

</xml_diff>

<commit_message>
slides: code formatting in basics
</commit_message>
<xml_diff>
--- a/slides/flink_batch_basics.pptx
+++ b/slides/flink_batch_basics.pptx
@@ -4278,8 +4278,8 @@
         </p:nvSpPr>
         <p:spPr>
           <a:xfrm>
-            <a:off x="0" y="1252157"/>
-            <a:ext cx="9144000" cy="5605843"/>
+            <a:off x="457200" y="1252157"/>
+            <a:ext cx="8229600" cy="5104193"/>
           </a:xfrm>
           <a:ln>
             <a:solidFill>
@@ -4291,38 +4291,9 @@
         </p:spPr>
         <p:txBody>
           <a:bodyPr>
-            <a:normAutofit fontScale="55000" lnSpcReduction="20000"/>
+            <a:normAutofit fontScale="47500" lnSpcReduction="20000"/>
           </a:bodyPr>
           <a:lstStyle/>
-          <a:p>
-            <a:pPr marL="0" indent="0">
-              <a:buNone/>
-            </a:pPr>
-            <a:r>
-              <a:rPr lang="en-US" dirty="0" smtClean="0">
-                <a:solidFill>
-                  <a:srgbClr val="6D6D6D"/>
-                </a:solidFill>
-                <a:latin typeface="Menlo"/>
-              </a:rPr>
-              <a:t>// The </a:t>
-            </a:r>
-            <a:r>
-              <a:rPr lang="en-US" dirty="0" err="1" smtClean="0">
-                <a:solidFill>
-                  <a:srgbClr val="6D6D6D"/>
-                </a:solidFill>
-                <a:latin typeface="Menlo"/>
-              </a:rPr>
-              <a:t>DataSet</a:t>
-            </a:r>
-            <a:endParaRPr lang="en-US" dirty="0" smtClean="0">
-              <a:solidFill>
-                <a:srgbClr val="6D6D6D"/>
-              </a:solidFill>
-              <a:latin typeface="Menlo"/>
-            </a:endParaRPr>
-          </a:p>
           <a:p>
             <a:pPr marL="0" indent="0">
               <a:buNone/>
@@ -4620,8 +4591,28 @@
               </a:rPr>
               <a:t> = </a:t>
             </a:r>
-            <a:r>
-              <a:rPr lang="en-US" dirty="0" err="1">
+            <a:endParaRPr lang="en-US" dirty="0" smtClean="0">
+              <a:solidFill>
+                <a:srgbClr val="000000"/>
+              </a:solidFill>
+              <a:latin typeface="Menlo"/>
+            </a:endParaRPr>
+          </a:p>
+          <a:p>
+            <a:pPr marL="0" indent="0">
+              <a:buNone/>
+            </a:pPr>
+            <a:r>
+              <a:rPr lang="en-US" dirty="0">
+                <a:solidFill>
+                  <a:srgbClr val="000000"/>
+                </a:solidFill>
+                <a:latin typeface="Menlo"/>
+              </a:rPr>
+              <a:t>	</a:t>
+            </a:r>
+            <a:r>
+              <a:rPr lang="en-US" dirty="0" err="1" smtClean="0">
                 <a:solidFill>
                   <a:srgbClr val="000000"/>
                 </a:solidFill>
@@ -4683,13 +4674,31 @@
               <a:t>    </a:t>
             </a:r>
             <a:r>
+              <a:rPr lang="en-US" dirty="0" smtClean="0">
+                <a:solidFill>
+                  <a:srgbClr val="000000"/>
+                </a:solidFill>
+                <a:latin typeface="Menlo"/>
+              </a:rPr>
+              <a:t>	</a:t>
+            </a:r>
+            <a:r>
+              <a:rPr lang="en-US" dirty="0" smtClean="0">
+                <a:solidFill>
+                  <a:srgbClr val="808000"/>
+                </a:solidFill>
+                <a:latin typeface="Menlo"/>
+              </a:rPr>
+              <a:t>@</a:t>
+            </a:r>
+            <a:r>
               <a:rPr lang="en-US" dirty="0">
                 <a:solidFill>
                   <a:srgbClr val="808000"/>
                 </a:solidFill>
                 <a:latin typeface="Menlo"/>
               </a:rPr>
-              <a:t>@Override</a:t>
+              <a:t>Override</a:t>
             </a:r>
             <a:br>
               <a:rPr lang="en-US" dirty="0">
@@ -4706,10 +4715,19 @@
                 </a:solidFill>
                 <a:latin typeface="Menlo"/>
               </a:rPr>
-              <a:t>    </a:t>
-            </a:r>
-            <a:r>
-              <a:rPr lang="en-US" b="1" dirty="0">
+              <a:t>  </a:t>
+            </a:r>
+            <a:r>
+              <a:rPr lang="en-US" dirty="0" smtClean="0">
+                <a:solidFill>
+                  <a:srgbClr val="808000"/>
+                </a:solidFill>
+                <a:latin typeface="Menlo"/>
+              </a:rPr>
+              <a:t>	    </a:t>
+            </a:r>
+            <a:r>
+              <a:rPr lang="en-US" b="1" dirty="0" smtClean="0">
                 <a:solidFill>
                   <a:srgbClr val="000080"/>
                 </a:solidFill>
@@ -4724,16 +4742,16 @@
                 </a:solidFill>
                 <a:latin typeface="Menlo"/>
               </a:rPr>
-              <a:t>Integer map(Integer value) </a:t>
-            </a:r>
-            <a:r>
-              <a:rPr lang="en-US" b="1" dirty="0">
-                <a:solidFill>
-                  <a:srgbClr val="000080"/>
-                </a:solidFill>
-                <a:latin typeface="Menlo"/>
-              </a:rPr>
-              <a:t>throws </a:t>
+              <a:t>Integer map(Integer value</a:t>
+            </a:r>
+            <a:r>
+              <a:rPr lang="en-US" dirty="0" smtClean="0">
+                <a:solidFill>
+                  <a:srgbClr val="000000"/>
+                </a:solidFill>
+                <a:latin typeface="Menlo"/>
+              </a:rPr>
+              <a:t>) {</a:t>
             </a:r>
             <a:r>
               <a:rPr lang="en-US" dirty="0">
@@ -4742,7 +4760,7 @@
                 </a:solidFill>
                 <a:latin typeface="Menlo"/>
               </a:rPr>
-              <a:t>Exception {</a:t>
+              <a:t/>
             </a:r>
             <a:br>
               <a:rPr lang="en-US" dirty="0">
@@ -4759,7 +4777,16 @@
                 </a:solidFill>
                 <a:latin typeface="Menlo"/>
               </a:rPr>
-              <a:t>        </a:t>
+              <a:t>     </a:t>
+            </a:r>
+            <a:r>
+              <a:rPr lang="en-US" dirty="0" smtClean="0">
+                <a:solidFill>
+                  <a:srgbClr val="000000"/>
+                </a:solidFill>
+                <a:latin typeface="Menlo"/>
+              </a:rPr>
+              <a:t>      </a:t>
             </a:r>
             <a:r>
               <a:rPr lang="en-US" b="1" dirty="0">
@@ -4812,16 +4839,46 @@
                 </a:solidFill>
                 <a:latin typeface="Menlo"/>
               </a:rPr>
+              <a:t>    </a:t>
+            </a:r>
+            <a:r>
+              <a:rPr lang="en-US" dirty="0" smtClean="0">
+                <a:solidFill>
+                  <a:srgbClr val="000000"/>
+                </a:solidFill>
+                <a:latin typeface="Menlo"/>
+              </a:rPr>
               <a:t>    }</a:t>
             </a:r>
-            <a:br>
+            <a:endParaRPr lang="en-US" dirty="0">
+              <a:solidFill>
+                <a:srgbClr val="000000"/>
+              </a:solidFill>
+              <a:latin typeface="Menlo"/>
+            </a:endParaRPr>
+          </a:p>
+          <a:p>
+            <a:pPr marL="0" indent="0">
+              <a:buNone/>
+            </a:pPr>
+            <a:r>
               <a:rPr lang="en-US" dirty="0">
                 <a:solidFill>
                   <a:srgbClr val="000000"/>
                 </a:solidFill>
                 <a:latin typeface="Menlo"/>
               </a:rPr>
-            </a:br>
+              <a:t> </a:t>
+            </a:r>
+            <a:r>
+              <a:rPr lang="en-US" dirty="0" smtClean="0">
+                <a:solidFill>
+                  <a:srgbClr val="000000"/>
+                </a:solidFill>
+                <a:latin typeface="Menlo"/>
+              </a:rPr>
+              <a:t>   }</a:t>
+            </a:r>
             <a:r>
               <a:rPr lang="en-US" dirty="0">
                 <a:solidFill>
@@ -4829,7 +4886,7 @@
                 </a:solidFill>
                 <a:latin typeface="Menlo"/>
               </a:rPr>
-              <a:t>})</a:t>
+              <a:t>)</a:t>
             </a:r>
             <a:r>
               <a:rPr lang="en-US" dirty="0" smtClean="0">
@@ -4897,8 +4954,30 @@
               </a:rPr>
               <a:t>&lt;Integer&gt; doubleIntegers2 = </a:t>
             </a:r>
-            <a:r>
-              <a:rPr lang="en-US" dirty="0" err="1">
+            <a:endParaRPr lang="en-US" dirty="0" smtClean="0">
+              <a:latin typeface="Menlo"/>
+            </a:endParaRPr>
+          </a:p>
+          <a:p>
+            <a:pPr marL="0" indent="0">
+              <a:buNone/>
+            </a:pPr>
+            <a:endParaRPr lang="en-US" dirty="0">
+              <a:latin typeface="Menlo"/>
+            </a:endParaRPr>
+          </a:p>
+          <a:p>
+            <a:pPr marL="0" indent="0">
+              <a:buNone/>
+            </a:pPr>
+            <a:r>
+              <a:rPr lang="en-US" dirty="0" smtClean="0">
+                <a:latin typeface="Menlo"/>
+              </a:rPr>
+              <a:t>	</a:t>
+            </a:r>
+            <a:r>
+              <a:rPr lang="en-US" dirty="0" err="1" smtClean="0">
                 <a:latin typeface="Menlo"/>
               </a:rPr>
               <a:t>integers.flatMap</a:t>
@@ -4954,13 +5033,31 @@
               <a:t>    </a:t>
             </a:r>
             <a:r>
+              <a:rPr lang="en-US" dirty="0" smtClean="0">
+                <a:solidFill>
+                  <a:srgbClr val="000000"/>
+                </a:solidFill>
+                <a:latin typeface="Menlo"/>
+              </a:rPr>
+              <a:t>	</a:t>
+            </a:r>
+            <a:r>
+              <a:rPr lang="en-US" dirty="0" smtClean="0">
+                <a:solidFill>
+                  <a:srgbClr val="808000"/>
+                </a:solidFill>
+                <a:latin typeface="Menlo"/>
+              </a:rPr>
+              <a:t>@</a:t>
+            </a:r>
+            <a:r>
               <a:rPr lang="en-US" dirty="0">
                 <a:solidFill>
                   <a:srgbClr val="808000"/>
                 </a:solidFill>
                 <a:latin typeface="Menlo"/>
               </a:rPr>
-              <a:t>@Override</a:t>
+              <a:t>Override</a:t>
             </a:r>
             <a:br>
               <a:rPr lang="en-US" dirty="0">
@@ -4980,13 +5077,31 @@
               <a:t>    </a:t>
             </a:r>
             <a:r>
+              <a:rPr lang="en-US" dirty="0" smtClean="0">
+                <a:solidFill>
+                  <a:srgbClr val="808000"/>
+                </a:solidFill>
+                <a:latin typeface="Menlo"/>
+              </a:rPr>
+              <a:t>	</a:t>
+            </a:r>
+            <a:r>
+              <a:rPr lang="en-US" b="1" dirty="0" smtClean="0">
+                <a:solidFill>
+                  <a:srgbClr val="000080"/>
+                </a:solidFill>
+                <a:latin typeface="Menlo"/>
+              </a:rPr>
+              <a:t>public </a:t>
+            </a:r>
+            <a:r>
               <a:rPr lang="en-US" b="1" dirty="0">
                 <a:solidFill>
                   <a:srgbClr val="000080"/>
                 </a:solidFill>
                 <a:latin typeface="Menlo"/>
               </a:rPr>
-              <a:t>public void </a:t>
+              <a:t>void </a:t>
             </a:r>
             <a:r>
               <a:rPr lang="en-US" dirty="0" err="1">
@@ -5042,7 +5157,16 @@
               <a:t>        </a:t>
             </a:r>
             <a:r>
-              <a:rPr lang="en-US" dirty="0" err="1">
+              <a:rPr lang="en-US" dirty="0" smtClean="0">
+                <a:solidFill>
+                  <a:srgbClr val="000000"/>
+                </a:solidFill>
+                <a:latin typeface="Menlo"/>
+              </a:rPr>
+              <a:t>	</a:t>
+            </a:r>
+            <a:r>
+              <a:rPr lang="en-US" dirty="0" err="1" smtClean="0">
                 <a:solidFill>
                   <a:srgbClr val="000000"/>
                 </a:solidFill>
@@ -5092,24 +5216,39 @@
                 </a:solidFill>
                 <a:latin typeface="Menlo"/>
               </a:rPr>
-              <a:t>    }</a:t>
-            </a:r>
-            <a:br>
+              <a:t>    </a:t>
+            </a:r>
+            <a:r>
+              <a:rPr lang="en-US" dirty="0" smtClean="0">
+                <a:solidFill>
+                  <a:srgbClr val="000000"/>
+                </a:solidFill>
+                <a:latin typeface="Menlo"/>
+              </a:rPr>
+              <a:t>	}</a:t>
+            </a:r>
+          </a:p>
+          <a:p>
+            <a:pPr marL="0" indent="0">
+              <a:buNone/>
+            </a:pPr>
+            <a:r>
+              <a:rPr lang="en-US" dirty="0" smtClean="0">
+                <a:solidFill>
+                  <a:srgbClr val="000000"/>
+                </a:solidFill>
+                <a:latin typeface="Menlo"/>
+              </a:rPr>
+              <a:t>	}</a:t>
+            </a:r>
+            <a:r>
               <a:rPr lang="en-US" dirty="0">
                 <a:solidFill>
                   <a:srgbClr val="000000"/>
                 </a:solidFill>
                 <a:latin typeface="Menlo"/>
               </a:rPr>
-            </a:br>
-            <a:r>
-              <a:rPr lang="en-US" dirty="0">
-                <a:solidFill>
-                  <a:srgbClr val="000000"/>
-                </a:solidFill>
-                <a:latin typeface="Menlo"/>
-              </a:rPr>
-              <a:t>})</a:t>
+              <a:t>)</a:t>
             </a:r>
             <a:r>
               <a:rPr lang="en-US" dirty="0" smtClean="0">
@@ -5454,7 +5593,38 @@
               <a:buNone/>
             </a:pPr>
             <a:r>
-              <a:rPr lang="en-US" sz="1800" dirty="0" err="1">
+              <a:rPr lang="en-US" sz="1800" dirty="0" err="1" smtClean="0">
+                <a:latin typeface="Menlo"/>
+              </a:rPr>
+              <a:t>DataSet</a:t>
+            </a:r>
+            <a:r>
+              <a:rPr lang="en-US" sz="1800" dirty="0" smtClean="0">
+                <a:latin typeface="Menlo"/>
+              </a:rPr>
+              <a:t>&lt;Integer&gt; filtered = </a:t>
+            </a:r>
+          </a:p>
+          <a:p>
+            <a:pPr marL="0" indent="0">
+              <a:buNone/>
+            </a:pPr>
+            <a:endParaRPr lang="en-US" sz="1800" dirty="0" smtClean="0">
+              <a:latin typeface="Menlo"/>
+            </a:endParaRPr>
+          </a:p>
+          <a:p>
+            <a:pPr marL="0" indent="0">
+              <a:buNone/>
+            </a:pPr>
+            <a:r>
+              <a:rPr lang="en-US" sz="1800" dirty="0" smtClean="0">
+                <a:latin typeface="Menlo"/>
+              </a:rPr>
+              <a:t>	</a:t>
+            </a:r>
+            <a:r>
+              <a:rPr lang="en-US" sz="1800" dirty="0" err="1" smtClean="0">
                 <a:latin typeface="Menlo"/>
               </a:rPr>
               <a:t>integers.filter</a:t>
@@ -5507,7 +5677,16 @@
                 </a:solidFill>
                 <a:latin typeface="Menlo"/>
               </a:rPr>
-              <a:t>    </a:t>
+              <a:t>   </a:t>
+            </a:r>
+            <a:r>
+              <a:rPr lang="en-US" sz="1800" dirty="0" smtClean="0">
+                <a:solidFill>
+                  <a:srgbClr val="000000"/>
+                </a:solidFill>
+                <a:latin typeface="Menlo"/>
+              </a:rPr>
+              <a:t>		 </a:t>
             </a:r>
             <a:r>
               <a:rPr lang="en-US" sz="1800" dirty="0">
@@ -5533,7 +5712,16 @@
                 </a:solidFill>
                 <a:latin typeface="Menlo"/>
               </a:rPr>
-              <a:t>    </a:t>
+              <a:t>  </a:t>
+            </a:r>
+            <a:r>
+              <a:rPr lang="en-US" sz="1800" dirty="0" smtClean="0">
+                <a:solidFill>
+                  <a:srgbClr val="808000"/>
+                </a:solidFill>
+                <a:latin typeface="Menlo"/>
+              </a:rPr>
+              <a:t>	    </a:t>
             </a:r>
             <a:r>
               <a:rPr lang="en-US" sz="1800" b="1" dirty="0">
@@ -5569,25 +5757,7 @@
                 </a:solidFill>
                 <a:latin typeface="Menlo"/>
               </a:rPr>
-              <a:t>filter(Integer value) </a:t>
-            </a:r>
-            <a:r>
-              <a:rPr lang="en-US" sz="1800" b="1" dirty="0">
-                <a:solidFill>
-                  <a:srgbClr val="000080"/>
-                </a:solidFill>
-                <a:latin typeface="Menlo"/>
-              </a:rPr>
-              <a:t>throws </a:t>
-            </a:r>
-            <a:r>
-              <a:rPr lang="en-US" sz="1800" dirty="0">
-                <a:solidFill>
-                  <a:srgbClr val="000000"/>
-                </a:solidFill>
-                <a:latin typeface="Menlo"/>
-              </a:rPr>
-              <a:t>Exception </a:t>
+              <a:t>filter(Integer value</a:t>
             </a:r>
             <a:r>
               <a:rPr lang="en-US" sz="1800" dirty="0" smtClean="0">
@@ -5596,21 +5766,7 @@
                 </a:solidFill>
                 <a:latin typeface="Menlo"/>
               </a:rPr>
-              <a:t>     </a:t>
-            </a:r>
-          </a:p>
-          <a:p>
-            <a:pPr marL="0" indent="0">
-              <a:buNone/>
-            </a:pPr>
-            <a:r>
-              <a:rPr lang="en-US" sz="1800" dirty="0">
-                <a:solidFill>
-                  <a:srgbClr val="000000"/>
-                </a:solidFill>
-                <a:latin typeface="Menlo"/>
-              </a:rPr>
-              <a:t> </a:t>
+              <a:t>) </a:t>
             </a:r>
             <a:r>
               <a:rPr lang="en-US" sz="1800" dirty="0" smtClean="0">
@@ -5619,7 +5775,7 @@
                 </a:solidFill>
                 <a:latin typeface="Menlo"/>
               </a:rPr>
-              <a:t>   {</a:t>
+              <a:t>{</a:t>
             </a:r>
             <a:br>
               <a:rPr lang="en-US" sz="1800" dirty="0" smtClean="0">
@@ -5636,7 +5792,16 @@
                 </a:solidFill>
                 <a:latin typeface="Menlo"/>
               </a:rPr>
-              <a:t>        </a:t>
+              <a:t>     </a:t>
+            </a:r>
+            <a:r>
+              <a:rPr lang="en-US" sz="1800" dirty="0" smtClean="0">
+                <a:solidFill>
+                  <a:srgbClr val="000000"/>
+                </a:solidFill>
+                <a:latin typeface="Menlo"/>
+              </a:rPr>
+              <a:t>       </a:t>
             </a:r>
             <a:r>
               <a:rPr lang="en-US" sz="1800" b="1" dirty="0">
@@ -5689,16 +5854,46 @@
                 </a:solidFill>
                 <a:latin typeface="Menlo"/>
               </a:rPr>
-              <a:t>    }</a:t>
-            </a:r>
-            <a:br>
+              <a:t>    </a:t>
+            </a:r>
+            <a:r>
+              <a:rPr lang="en-US" sz="1800" dirty="0" smtClean="0">
+                <a:solidFill>
+                  <a:srgbClr val="000000"/>
+                </a:solidFill>
+                <a:latin typeface="Menlo"/>
+              </a:rPr>
+              <a:t>   }</a:t>
+            </a:r>
+            <a:endParaRPr lang="en-US" sz="1800" dirty="0">
+              <a:solidFill>
+                <a:srgbClr val="000000"/>
+              </a:solidFill>
+              <a:latin typeface="Menlo"/>
+            </a:endParaRPr>
+          </a:p>
+          <a:p>
+            <a:pPr marL="0" indent="0">
+              <a:buNone/>
+            </a:pPr>
+            <a:r>
               <a:rPr lang="en-US" sz="1800" dirty="0">
                 <a:solidFill>
                   <a:srgbClr val="000000"/>
                 </a:solidFill>
                 <a:latin typeface="Menlo"/>
               </a:rPr>
-            </a:br>
+              <a:t> </a:t>
+            </a:r>
+            <a:r>
+              <a:rPr lang="en-US" sz="1800" dirty="0" smtClean="0">
+                <a:solidFill>
+                  <a:srgbClr val="000000"/>
+                </a:solidFill>
+                <a:latin typeface="Menlo"/>
+              </a:rPr>
+              <a:t>  }</a:t>
+            </a:r>
             <a:r>
               <a:rPr lang="en-US" sz="1800" dirty="0">
                 <a:solidFill>
@@ -5706,7 +5901,7 @@
                 </a:solidFill>
                 <a:latin typeface="Menlo"/>
               </a:rPr>
-              <a:t>})</a:t>
+              <a:t>)</a:t>
             </a:r>
             <a:r>
               <a:rPr lang="en-US" sz="1800" dirty="0" smtClean="0">
@@ -6756,7 +6951,16 @@
                 </a:solidFill>
                 <a:latin typeface="Menlo"/>
               </a:rPr>
-              <a:t>Boolean fired = person.</a:t>
+              <a:t>Boolean fired = </a:t>
+            </a:r>
+            <a:r>
+              <a:rPr lang="en-US" sz="1300" dirty="0" smtClean="0">
+                <a:solidFill>
+                  <a:srgbClr val="000000"/>
+                </a:solidFill>
+                <a:latin typeface="Menlo"/>
+              </a:rPr>
+              <a:t>person.</a:t>
             </a:r>
             <a:r>
               <a:rPr lang="en-US" sz="1300" b="1" dirty="0" smtClean="0">
@@ -6765,7 +6969,7 @@
                 </a:solidFill>
                 <a:latin typeface="Menlo"/>
               </a:rPr>
-              <a:t>f4</a:t>
+              <a:t>f3</a:t>
             </a:r>
             <a:r>
               <a:rPr lang="en-US" sz="1300" dirty="0" smtClean="0">
@@ -7356,16 +7560,16 @@
                 </a:solidFill>
                 <a:latin typeface="Menlo"/>
               </a:rPr>
-              <a:t>&lt;Tuple2&lt;String, Integer&gt;&gt; values, Collector&lt;Tuple2&lt;Integer, Integer&gt;&gt; out) </a:t>
-            </a:r>
-            <a:r>
-              <a:rPr lang="en-US" sz="1500" b="1" dirty="0">
-                <a:solidFill>
-                  <a:srgbClr val="000080"/>
-                </a:solidFill>
-                <a:latin typeface="Menlo"/>
-              </a:rPr>
-              <a:t>throws </a:t>
+              <a:t>&lt;Tuple2&lt;String, Integer&gt;&gt; values, </a:t>
+            </a:r>
+            <a:r>
+              <a:rPr lang="en-US" sz="1500" dirty="0" smtClean="0">
+                <a:solidFill>
+                  <a:srgbClr val="000000"/>
+                </a:solidFill>
+                <a:latin typeface="Menlo"/>
+              </a:rPr>
+              <a:t>			       		   Collector</a:t>
             </a:r>
             <a:r>
               <a:rPr lang="en-US" sz="1500" dirty="0">
@@ -7374,7 +7578,25 @@
                 </a:solidFill>
                 <a:latin typeface="Menlo"/>
               </a:rPr>
-              <a:t>Exception {</a:t>
+              <a:t>&lt;Tuple2&lt;Integer, Integer&gt;&gt; out) </a:t>
+            </a:r>
+            <a:r>
+              <a:rPr lang="en-US" sz="1500" dirty="0" smtClean="0">
+                <a:solidFill>
+                  <a:srgbClr val="000000"/>
+                </a:solidFill>
+                <a:latin typeface="Menlo"/>
+              </a:rPr>
+              <a:t>{</a:t>
+            </a:r>
+            <a:r>
+              <a:rPr lang="en-US" sz="1500" dirty="0">
+                <a:solidFill>
+                  <a:srgbClr val="000000"/>
+                </a:solidFill>
+                <a:latin typeface="Menlo"/>
+              </a:rPr>
+              <a:t/>
             </a:r>
             <a:br>
               <a:rPr lang="en-US" sz="1500" dirty="0">
@@ -7673,7 +7895,48 @@
                 </a:solidFill>
                 <a:latin typeface="Menlo"/>
               </a:rPr>
-              <a:t>Tuple2&lt;Integer, Integer&gt;(</a:t>
+              <a:t>Tuple2&lt;Integer, Integer</a:t>
+            </a:r>
+            <a:r>
+              <a:rPr lang="en-US" sz="1500" dirty="0" smtClean="0">
+                <a:solidFill>
+                  <a:srgbClr val="000000"/>
+                </a:solidFill>
+                <a:latin typeface="Menlo"/>
+              </a:rPr>
+              <a:t>&gt;</a:t>
+            </a:r>
+          </a:p>
+          <a:p>
+            <a:pPr marL="0" indent="0">
+              <a:buNone/>
+            </a:pPr>
+            <a:r>
+              <a:rPr lang="en-US" sz="1500" dirty="0">
+                <a:solidFill>
+                  <a:srgbClr val="000000"/>
+                </a:solidFill>
+                <a:latin typeface="Menlo"/>
+              </a:rPr>
+              <a:t>	</a:t>
+            </a:r>
+            <a:r>
+              <a:rPr lang="en-US" sz="1500" dirty="0" smtClean="0">
+                <a:solidFill>
+                  <a:srgbClr val="000000"/>
+                </a:solidFill>
+                <a:latin typeface="Menlo"/>
+              </a:rPr>
+              <a:t>										</a:t>
+            </a:r>
+            <a:r>
+              <a:rPr lang="en-US" sz="1500" dirty="0" smtClean="0">
+                <a:solidFill>
+                  <a:srgbClr val="000000"/>
+                </a:solidFill>
+                <a:latin typeface="Menlo"/>
+              </a:rPr>
+              <a:t>(</a:t>
             </a:r>
             <a:r>
               <a:rPr lang="en-US" sz="1500" dirty="0" err="1">
@@ -8062,7 +8325,7 @@
                 </a:solidFill>
                 <a:latin typeface="Menlo"/>
               </a:rPr>
-              <a:t>Tuple3</a:t>
+              <a:t>			Tuple3</a:t>
             </a:r>
             <a:r>
               <a:rPr lang="en-US" sz="1600" dirty="0">
@@ -8091,7 +8354,7 @@
                 </a:solidFill>
                 <a:latin typeface="Menlo"/>
               </a:rPr>
-              <a:t>Tuple3</a:t>
+              <a:t>			Tuple3</a:t>
             </a:r>
             <a:r>
               <a:rPr lang="en-US" sz="1600" dirty="0">
@@ -8111,6 +8374,12 @@
               </a:rPr>
               <a:t>&gt;</a:t>
             </a:r>
+            <a:endParaRPr lang="en-US" sz="1600" dirty="0" smtClean="0">
+              <a:solidFill>
+                <a:srgbClr val="000000"/>
+              </a:solidFill>
+              <a:latin typeface="Menlo"/>
+            </a:endParaRPr>
           </a:p>
           <a:p>
             <a:pPr marL="0" indent="0">
@@ -8123,7 +8392,16 @@
                 </a:solidFill>
                 <a:latin typeface="Menlo"/>
               </a:rPr>
-              <a:t>&gt;&gt; </a:t>
+              <a:t>		&gt;</a:t>
+            </a:r>
+            <a:r>
+              <a:rPr lang="en-US" sz="1600" dirty="0" smtClean="0">
+                <a:solidFill>
+                  <a:srgbClr val="000000"/>
+                </a:solidFill>
+                <a:latin typeface="Menlo"/>
+              </a:rPr>
+              <a:t>&gt; </a:t>
             </a:r>
             <a:r>
               <a:rPr lang="en-US" sz="1600" dirty="0">
@@ -8346,7 +8624,7 @@
               <a:buNone/>
             </a:pPr>
             <a:r>
-              <a:rPr lang="en-US" sz="1600" i="1" dirty="0" smtClean="0">
+              <a:rPr lang="en-US" sz="2100" i="1" dirty="0" smtClean="0">
                 <a:solidFill>
                   <a:srgbClr val="808080"/>
                 </a:solidFill>
@@ -8355,7 +8633,7 @@
               <a:t>/</a:t>
             </a:r>
             <a:r>
-              <a:rPr lang="en-US" sz="1600" i="1" dirty="0">
+              <a:rPr lang="en-US" sz="2100" i="1" dirty="0">
                 <a:solidFill>
                   <a:srgbClr val="808080"/>
                 </a:solidFill>
@@ -8364,7 +8642,7 @@
               <a:t>/ authors (id, name, email)</a:t>
             </a:r>
             <a:br>
-              <a:rPr lang="en-US" sz="1600" i="1" dirty="0">
+              <a:rPr lang="en-US" sz="2100" i="1" dirty="0">
                 <a:solidFill>
                   <a:srgbClr val="808080"/>
                 </a:solidFill>
@@ -8372,7 +8650,7 @@
               </a:rPr>
             </a:br>
             <a:r>
-              <a:rPr lang="en-US" sz="1600" dirty="0" err="1">
+              <a:rPr lang="en-US" sz="2100" dirty="0" err="1">
                 <a:solidFill>
                   <a:srgbClr val="000000"/>
                 </a:solidFill>
@@ -8381,83 +8659,92 @@
               <a:t>DataSet</a:t>
             </a:r>
             <a:r>
+              <a:rPr lang="en-US" sz="2100" dirty="0">
+                <a:solidFill>
+                  <a:srgbClr val="000000"/>
+                </a:solidFill>
+                <a:latin typeface="Menlo"/>
+              </a:rPr>
+              <a:t>&lt;Tuple3&lt;Integer, String, String&gt;&gt; authors = ..;</a:t>
+            </a:r>
+            <a:br>
+              <a:rPr lang="en-US" sz="2100" dirty="0">
+                <a:solidFill>
+                  <a:srgbClr val="000000"/>
+                </a:solidFill>
+                <a:latin typeface="Menlo"/>
+              </a:rPr>
+            </a:br>
+            <a:r>
+              <a:rPr lang="en-US" sz="2100" i="1" dirty="0">
+                <a:solidFill>
+                  <a:srgbClr val="808080"/>
+                </a:solidFill>
+                <a:latin typeface="Menlo"/>
+              </a:rPr>
+              <a:t>// posts (title, content, </a:t>
+            </a:r>
+            <a:r>
+              <a:rPr lang="en-US" sz="2100" i="1" dirty="0" err="1" smtClean="0">
+                <a:solidFill>
+                  <a:srgbClr val="808080"/>
+                </a:solidFill>
+                <a:latin typeface="Menlo"/>
+              </a:rPr>
+              <a:t>author_id</a:t>
+            </a:r>
+            <a:r>
+              <a:rPr lang="en-US" sz="2100" i="1" dirty="0" smtClean="0">
+                <a:solidFill>
+                  <a:srgbClr val="808080"/>
+                </a:solidFill>
+                <a:latin typeface="Menlo"/>
+              </a:rPr>
+              <a:t>)</a:t>
+            </a:r>
+            <a:r>
+              <a:rPr lang="en-US" sz="2100" i="1" dirty="0">
+                <a:solidFill>
+                  <a:srgbClr val="808080"/>
+                </a:solidFill>
+                <a:latin typeface="Menlo"/>
+              </a:rPr>
+              <a:t/>
+            </a:r>
+            <a:br>
+              <a:rPr lang="en-US" sz="2100" i="1" dirty="0">
+                <a:solidFill>
+                  <a:srgbClr val="808080"/>
+                </a:solidFill>
+                <a:latin typeface="Menlo"/>
+              </a:rPr>
+            </a:br>
+            <a:r>
+              <a:rPr lang="en-US" sz="2100" dirty="0" err="1">
+                <a:solidFill>
+                  <a:srgbClr val="000000"/>
+                </a:solidFill>
+                <a:latin typeface="Menlo"/>
+              </a:rPr>
+              <a:t>DataSet</a:t>
+            </a:r>
+            <a:r>
+              <a:rPr lang="en-US" sz="2100" dirty="0">
+                <a:solidFill>
+                  <a:srgbClr val="000000"/>
+                </a:solidFill>
+                <a:latin typeface="Menlo"/>
+              </a:rPr>
+              <a:t>&lt;Tuple3&lt;String, String, Integer&gt;&gt; posts = ..;</a:t>
+            </a:r>
+            <a:r>
               <a:rPr lang="en-US" sz="1600" dirty="0">
                 <a:solidFill>
                   <a:srgbClr val="000000"/>
                 </a:solidFill>
                 <a:latin typeface="Menlo"/>
               </a:rPr>
-              <a:t>&lt;Tuple3&lt;Integer, String, String&gt;&gt; authors = ..;</a:t>
-            </a:r>
-            <a:br>
-              <a:rPr lang="en-US" sz="1600" dirty="0">
-                <a:solidFill>
-                  <a:srgbClr val="000000"/>
-                </a:solidFill>
-                <a:latin typeface="Menlo"/>
-              </a:rPr>
-            </a:br>
-            <a:r>
-              <a:rPr lang="en-US" sz="1600" i="1" dirty="0">
-                <a:solidFill>
-                  <a:srgbClr val="808080"/>
-                </a:solidFill>
-                <a:latin typeface="Menlo"/>
-              </a:rPr>
-              <a:t>// posts (title, content, </a:t>
-            </a:r>
-            <a:r>
-              <a:rPr lang="en-US" sz="1600" i="1" dirty="0" err="1" smtClean="0">
-                <a:solidFill>
-                  <a:srgbClr val="808080"/>
-                </a:solidFill>
-                <a:latin typeface="Menlo"/>
-              </a:rPr>
-              <a:t>author_id</a:t>
-            </a:r>
-            <a:r>
-              <a:rPr lang="en-US" sz="1600" i="1" dirty="0" smtClean="0">
-                <a:solidFill>
-                  <a:srgbClr val="808080"/>
-                </a:solidFill>
-                <a:latin typeface="Menlo"/>
-              </a:rPr>
-              <a:t>)</a:t>
-            </a:r>
-            <a:r>
-              <a:rPr lang="en-US" sz="1600" i="1" dirty="0">
-                <a:solidFill>
-                  <a:srgbClr val="808080"/>
-                </a:solidFill>
-                <a:latin typeface="Menlo"/>
-              </a:rPr>
               <a:t/>
-            </a:r>
-            <a:br>
-              <a:rPr lang="en-US" sz="1600" i="1" dirty="0">
-                <a:solidFill>
-                  <a:srgbClr val="808080"/>
-                </a:solidFill>
-                <a:latin typeface="Menlo"/>
-              </a:rPr>
-            </a:br>
-            <a:r>
-              <a:rPr lang="en-US" sz="1600" dirty="0" err="1">
-                <a:solidFill>
-                  <a:srgbClr val="000000"/>
-                </a:solidFill>
-                <a:latin typeface="Menlo"/>
-              </a:rPr>
-              <a:t>DataSet</a:t>
-            </a:r>
-            <a:r>
-              <a:rPr lang="en-US" sz="1600" dirty="0">
-                <a:solidFill>
-                  <a:srgbClr val="000000"/>
-                </a:solidFill>
-                <a:latin typeface="Menlo"/>
-              </a:rPr>
-              <a:t>&lt;Tuple3&lt;String, String, Integer&gt;&gt; posts = ..;</a:t>
             </a:r>
             <a:br>
               <a:rPr lang="en-US" sz="1600" dirty="0">
@@ -12924,8 +13211,15 @@
           <a:p>
             <a:r>
               <a:rPr lang="en-US" dirty="0" smtClean="0"/>
-              <a:t>Collection Source</a:t>
-            </a:r>
+              <a:t>Collection </a:t>
+            </a:r>
+            <a:r>
+              <a:rPr lang="en-US" dirty="0" smtClean="0"/>
+              <a:t>Source</a:t>
+            </a:r>
+          </a:p>
+          <a:p>
+            <a:endParaRPr lang="en-US" dirty="0" smtClean="0"/>
           </a:p>
           <a:p>
             <a:r>
@@ -13688,7 +13982,39 @@
               <a:t> = </a:t>
             </a:r>
             <a:r>
-              <a:rPr lang="en-US" sz="1600" dirty="0" err="1">
+              <a:rPr lang="en-US" sz="1600" dirty="0" smtClean="0">
+                <a:solidFill>
+                  <a:srgbClr val="000000"/>
+                </a:solidFill>
+                <a:latin typeface="Menlo"/>
+              </a:rPr>
+              <a:t>				    		</a:t>
+            </a:r>
+          </a:p>
+          <a:p>
+            <a:pPr marL="0" indent="0">
+              <a:buNone/>
+            </a:pPr>
+            <a:r>
+              <a:rPr lang="en-US" sz="1600" dirty="0">
+                <a:solidFill>
+                  <a:srgbClr val="000000"/>
+                </a:solidFill>
+                <a:latin typeface="Menlo"/>
+              </a:rPr>
+              <a:t>	</a:t>
+            </a:r>
+            <a:r>
+              <a:rPr lang="en-US" sz="1600" dirty="0" smtClean="0">
+                <a:solidFill>
+                  <a:srgbClr val="000000"/>
+                </a:solidFill>
+                <a:latin typeface="Menlo"/>
+              </a:rPr>
+              <a:t>	</a:t>
+            </a:r>
+            <a:r>
+              <a:rPr lang="en-US" sz="1600" dirty="0" err="1" smtClean="0">
                 <a:solidFill>
                   <a:srgbClr val="000000"/>
                 </a:solidFill>
@@ -13697,7 +14023,7 @@
               <a:t>ExecutionEnvironment.</a:t>
             </a:r>
             <a:r>
-              <a:rPr lang="en-US" sz="1600" i="1" dirty="0" err="1">
+              <a:rPr lang="en-US" sz="1600" i="1" dirty="0" err="1" smtClean="0">
                 <a:solidFill>
                   <a:srgbClr val="000000"/>
                 </a:solidFill>
@@ -15584,23 +15910,46 @@
               <a:t>public void </a:t>
             </a:r>
             <a:r>
+              <a:rPr lang="en-US" sz="1800" dirty="0" smtClean="0">
+                <a:solidFill>
+                  <a:srgbClr val="000000"/>
+                </a:solidFill>
+                <a:latin typeface="Menlo"/>
+              </a:rPr>
+              <a:t>reduce(</a:t>
+            </a:r>
+            <a:r>
+              <a:rPr lang="en-US" sz="1800" dirty="0" err="1" smtClean="0">
+                <a:solidFill>
+                  <a:srgbClr val="000000"/>
+                </a:solidFill>
+                <a:latin typeface="Menlo"/>
+              </a:rPr>
+              <a:t>Iterable</a:t>
+            </a:r>
+            <a:r>
               <a:rPr lang="en-US" sz="1800" dirty="0">
                 <a:solidFill>
                   <a:srgbClr val="000000"/>
                 </a:solidFill>
                 <a:latin typeface="Menlo"/>
               </a:rPr>
-              <a:t>reduce(</a:t>
-            </a:r>
-            <a:r>
-              <a:rPr lang="en-US" sz="1800" dirty="0" err="1">
-                <a:solidFill>
-                  <a:srgbClr val="000000"/>
-                </a:solidFill>
-                <a:latin typeface="Menlo"/>
-              </a:rPr>
-              <a:t>Iterable</a:t>
-            </a:r>
+              <a:t>&lt;Tuple2&lt;String, Integer&gt;&gt; values</a:t>
+            </a:r>
+            <a:r>
+              <a:rPr lang="en-US" sz="1800" dirty="0" smtClean="0">
+                <a:solidFill>
+                  <a:srgbClr val="000000"/>
+                </a:solidFill>
+                <a:latin typeface="Menlo"/>
+              </a:rPr>
+              <a:t>,</a:t>
+            </a:r>
+          </a:p>
+          <a:p>
+            <a:pPr marL="0" indent="0">
+              <a:buNone/>
+            </a:pPr>
             <a:r>
               <a:rPr lang="en-US" sz="1800" dirty="0">
                 <a:solidFill>
@@ -15608,7 +15957,7 @@
                 </a:solidFill>
                 <a:latin typeface="Menlo"/>
               </a:rPr>
-              <a:t>&lt;Tuple2&lt;String, Integer&gt;&gt; values</a:t>
+              <a:t> </a:t>
             </a:r>
             <a:r>
               <a:rPr lang="en-US" sz="1800" dirty="0" smtClean="0">
@@ -15617,21 +15966,125 @@
                 </a:solidFill>
                 <a:latin typeface="Menlo"/>
               </a:rPr>
-              <a:t>,</a:t>
-            </a:r>
+              <a:t>     </a:t>
+            </a:r>
+            <a:r>
+              <a:rPr lang="en-US" sz="1800" dirty="0" smtClean="0">
+                <a:solidFill>
+                  <a:srgbClr val="000000"/>
+                </a:solidFill>
+                <a:latin typeface="Menlo"/>
+              </a:rPr>
+              <a:t>  Collector</a:t>
+            </a:r>
+            <a:r>
+              <a:rPr lang="en-US" sz="1800" dirty="0">
+                <a:solidFill>
+                  <a:srgbClr val="000000"/>
+                </a:solidFill>
+                <a:latin typeface="Menlo"/>
+              </a:rPr>
+              <a:t>&lt;Tuple2&lt;String, Integer&gt;&gt; out) </a:t>
+            </a:r>
+            <a:r>
+              <a:rPr lang="en-US" sz="1800" dirty="0" smtClean="0">
+                <a:solidFill>
+                  <a:srgbClr val="000000"/>
+                </a:solidFill>
+                <a:latin typeface="Menlo"/>
+              </a:rPr>
+              <a:t>{</a:t>
+            </a:r>
+            <a:endParaRPr lang="en-US" sz="1800" dirty="0" smtClean="0">
+              <a:solidFill>
+                <a:srgbClr val="000000"/>
+              </a:solidFill>
+              <a:latin typeface="Menlo"/>
+            </a:endParaRPr>
           </a:p>
           <a:p>
             <a:pPr marL="0" indent="0">
               <a:buNone/>
             </a:pPr>
             <a:r>
+              <a:rPr lang="en-US" sz="1800" dirty="0" smtClean="0">
+                <a:solidFill>
+                  <a:srgbClr val="000000"/>
+                </a:solidFill>
+                <a:latin typeface="Menlo"/>
+              </a:rPr>
+              <a:t>       </a:t>
+            </a:r>
+            <a:r>
+              <a:rPr lang="en-US" sz="1800" dirty="0" smtClean="0">
+                <a:solidFill>
+                  <a:srgbClr val="000000"/>
+                </a:solidFill>
+                <a:latin typeface="Menlo"/>
+              </a:rPr>
+              <a:t>   </a:t>
+            </a:r>
+            <a:r>
+              <a:rPr lang="en-US" sz="1800" b="1" dirty="0" err="1">
+                <a:solidFill>
+                  <a:srgbClr val="000080"/>
+                </a:solidFill>
+                <a:latin typeface="Menlo"/>
+              </a:rPr>
+              <a:t>int</a:t>
+            </a:r>
+            <a:r>
+              <a:rPr lang="en-US" sz="1800" b="1" dirty="0">
+                <a:solidFill>
+                  <a:srgbClr val="000080"/>
+                </a:solidFill>
+                <a:latin typeface="Menlo"/>
+              </a:rPr>
+              <a:t> </a:t>
+            </a:r>
+            <a:r>
               <a:rPr lang="en-US" sz="1800" dirty="0">
                 <a:solidFill>
                   <a:srgbClr val="000000"/>
                 </a:solidFill>
                 <a:latin typeface="Menlo"/>
               </a:rPr>
-              <a:t> </a:t>
+              <a:t>count = </a:t>
+            </a:r>
+            <a:r>
+              <a:rPr lang="en-US" sz="1800" dirty="0">
+                <a:solidFill>
+                  <a:srgbClr val="0000FF"/>
+                </a:solidFill>
+                <a:latin typeface="Menlo"/>
+              </a:rPr>
+              <a:t>0</a:t>
+            </a:r>
+            <a:r>
+              <a:rPr lang="en-US" sz="1800" dirty="0">
+                <a:solidFill>
+                  <a:srgbClr val="000000"/>
+                </a:solidFill>
+                <a:latin typeface="Menlo"/>
+              </a:rPr>
+              <a:t>;</a:t>
+            </a:r>
+            <a:br>
+              <a:rPr lang="en-US" sz="1800" dirty="0">
+                <a:solidFill>
+                  <a:srgbClr val="000000"/>
+                </a:solidFill>
+                <a:latin typeface="Menlo"/>
+              </a:rPr>
+            </a:br>
+            <a:r>
+              <a:rPr lang="en-US" sz="1800" dirty="0">
+                <a:solidFill>
+                  <a:srgbClr val="000000"/>
+                </a:solidFill>
+                <a:latin typeface="Menlo"/>
+              </a:rPr>
+              <a:t>      </a:t>
             </a:r>
             <a:r>
               <a:rPr lang="en-US" sz="1800" dirty="0" smtClean="0">
@@ -15640,7 +16093,7 @@
                 </a:solidFill>
                 <a:latin typeface="Menlo"/>
               </a:rPr>
-              <a:t>     Collector</a:t>
+              <a:t>    </a:t>
             </a:r>
             <a:r>
               <a:rPr lang="en-US" sz="1800" dirty="0">
@@ -15649,7 +16102,7 @@
                 </a:solidFill>
                 <a:latin typeface="Menlo"/>
               </a:rPr>
-              <a:t>&lt;Tuple2&lt;String, Integer&gt;&gt; out) </a:t>
+              <a:t>String word = </a:t>
             </a:r>
             <a:r>
               <a:rPr lang="en-US" sz="1800" b="1" dirty="0">
@@ -15658,7 +16111,7 @@
                 </a:solidFill>
                 <a:latin typeface="Menlo"/>
               </a:rPr>
-              <a:t>throws </a:t>
+              <a:t>null</a:t>
             </a:r>
             <a:r>
               <a:rPr lang="en-US" sz="1800" dirty="0">
@@ -15667,7 +16120,271 @@
                 </a:solidFill>
                 <a:latin typeface="Menlo"/>
               </a:rPr>
-              <a:t>Exception {</a:t>
+              <a:t>;</a:t>
+            </a:r>
+            <a:br>
+              <a:rPr lang="en-US" sz="1800" dirty="0">
+                <a:solidFill>
+                  <a:srgbClr val="000000"/>
+                </a:solidFill>
+                <a:latin typeface="Menlo"/>
+              </a:rPr>
+            </a:br>
+            <a:r>
+              <a:rPr lang="en-US" sz="1800" dirty="0">
+                <a:solidFill>
+                  <a:srgbClr val="000000"/>
+                </a:solidFill>
+                <a:latin typeface="Menlo"/>
+              </a:rPr>
+              <a:t>        </a:t>
+            </a:r>
+            <a:r>
+              <a:rPr lang="en-US" sz="1800" dirty="0" smtClean="0">
+                <a:solidFill>
+                  <a:srgbClr val="000000"/>
+                </a:solidFill>
+                <a:latin typeface="Menlo"/>
+              </a:rPr>
+              <a:t>  </a:t>
+            </a:r>
+            <a:r>
+              <a:rPr lang="en-US" sz="1800" b="1" dirty="0" smtClean="0">
+                <a:solidFill>
+                  <a:srgbClr val="000080"/>
+                </a:solidFill>
+                <a:latin typeface="Menlo"/>
+              </a:rPr>
+              <a:t>for </a:t>
+            </a:r>
+            <a:r>
+              <a:rPr lang="en-US" sz="1800" dirty="0">
+                <a:solidFill>
+                  <a:srgbClr val="000000"/>
+                </a:solidFill>
+                <a:latin typeface="Menlo"/>
+              </a:rPr>
+              <a:t>(Tuple2&lt;String, Integer&gt; tuple : values) {</a:t>
+            </a:r>
+            <a:br>
+              <a:rPr lang="en-US" sz="1800" dirty="0">
+                <a:solidFill>
+                  <a:srgbClr val="000000"/>
+                </a:solidFill>
+                <a:latin typeface="Menlo"/>
+              </a:rPr>
+            </a:br>
+            <a:r>
+              <a:rPr lang="en-US" sz="1800" dirty="0">
+                <a:solidFill>
+                  <a:srgbClr val="000000"/>
+                </a:solidFill>
+                <a:latin typeface="Menlo"/>
+              </a:rPr>
+              <a:t>       </a:t>
+            </a:r>
+            <a:r>
+              <a:rPr lang="en-US" sz="1800" dirty="0" smtClean="0">
+                <a:solidFill>
+                  <a:srgbClr val="000000"/>
+                </a:solidFill>
+                <a:latin typeface="Menlo"/>
+              </a:rPr>
+              <a:t>       </a:t>
+            </a:r>
+            <a:r>
+              <a:rPr lang="en-US" sz="1800" dirty="0">
+                <a:solidFill>
+                  <a:srgbClr val="000000"/>
+                </a:solidFill>
+                <a:latin typeface="Menlo"/>
+              </a:rPr>
+              <a:t>word = tuple.</a:t>
+            </a:r>
+            <a:r>
+              <a:rPr lang="en-US" sz="1800" b="1" dirty="0">
+                <a:solidFill>
+                  <a:srgbClr val="660E7A"/>
+                </a:solidFill>
+                <a:latin typeface="Menlo"/>
+              </a:rPr>
+              <a:t>f0</a:t>
+            </a:r>
+            <a:r>
+              <a:rPr lang="en-US" sz="1800" dirty="0">
+                <a:solidFill>
+                  <a:srgbClr val="000000"/>
+                </a:solidFill>
+                <a:latin typeface="Menlo"/>
+              </a:rPr>
+              <a:t>;</a:t>
+            </a:r>
+            <a:br>
+              <a:rPr lang="en-US" sz="1800" dirty="0">
+                <a:solidFill>
+                  <a:srgbClr val="000000"/>
+                </a:solidFill>
+                <a:latin typeface="Menlo"/>
+              </a:rPr>
+            </a:br>
+            <a:r>
+              <a:rPr lang="en-US" sz="1800" dirty="0">
+                <a:solidFill>
+                  <a:srgbClr val="000000"/>
+                </a:solidFill>
+                <a:latin typeface="Menlo"/>
+              </a:rPr>
+              <a:t>         </a:t>
+            </a:r>
+            <a:r>
+              <a:rPr lang="en-US" sz="1800" dirty="0" smtClean="0">
+                <a:solidFill>
+                  <a:srgbClr val="000000"/>
+                </a:solidFill>
+                <a:latin typeface="Menlo"/>
+              </a:rPr>
+              <a:t>     </a:t>
+            </a:r>
+            <a:r>
+              <a:rPr lang="en-US" sz="1800" dirty="0">
+                <a:solidFill>
+                  <a:srgbClr val="000000"/>
+                </a:solidFill>
+                <a:latin typeface="Menlo"/>
+              </a:rPr>
+              <a:t>count++;</a:t>
+            </a:r>
+            <a:br>
+              <a:rPr lang="en-US" sz="1800" dirty="0">
+                <a:solidFill>
+                  <a:srgbClr val="000000"/>
+                </a:solidFill>
+                <a:latin typeface="Menlo"/>
+              </a:rPr>
+            </a:br>
+            <a:r>
+              <a:rPr lang="en-US" sz="1800" dirty="0">
+                <a:solidFill>
+                  <a:srgbClr val="000000"/>
+                </a:solidFill>
+                <a:latin typeface="Menlo"/>
+              </a:rPr>
+              <a:t>        </a:t>
+            </a:r>
+            <a:r>
+              <a:rPr lang="en-US" sz="1800" dirty="0" smtClean="0">
+                <a:solidFill>
+                  <a:srgbClr val="000000"/>
+                </a:solidFill>
+                <a:latin typeface="Menlo"/>
+              </a:rPr>
+              <a:t>  }</a:t>
+            </a:r>
+            <a:r>
+              <a:rPr lang="en-US" sz="1800" dirty="0">
+                <a:solidFill>
+                  <a:srgbClr val="000000"/>
+                </a:solidFill>
+                <a:latin typeface="Menlo"/>
+              </a:rPr>
+              <a:t/>
+            </a:r>
+            <a:br>
+              <a:rPr lang="en-US" sz="1800" dirty="0">
+                <a:solidFill>
+                  <a:srgbClr val="000000"/>
+                </a:solidFill>
+                <a:latin typeface="Menlo"/>
+              </a:rPr>
+            </a:br>
+            <a:r>
+              <a:rPr lang="en-US" sz="1800" dirty="0">
+                <a:solidFill>
+                  <a:srgbClr val="000000"/>
+                </a:solidFill>
+                <a:latin typeface="Menlo"/>
+              </a:rPr>
+              <a:t>        </a:t>
+            </a:r>
+            <a:r>
+              <a:rPr lang="en-US" sz="1800" dirty="0" smtClean="0">
+                <a:solidFill>
+                  <a:srgbClr val="000000"/>
+                </a:solidFill>
+                <a:latin typeface="Menlo"/>
+              </a:rPr>
+              <a:t>  </a:t>
+            </a:r>
+            <a:r>
+              <a:rPr lang="en-US" sz="1800" dirty="0" err="1" smtClean="0">
+                <a:solidFill>
+                  <a:srgbClr val="000000"/>
+                </a:solidFill>
+                <a:latin typeface="Menlo"/>
+              </a:rPr>
+              <a:t>out.collect</a:t>
+            </a:r>
+            <a:r>
+              <a:rPr lang="en-US" sz="1800" dirty="0">
+                <a:solidFill>
+                  <a:srgbClr val="000000"/>
+                </a:solidFill>
+                <a:latin typeface="Menlo"/>
+              </a:rPr>
+              <a:t>(</a:t>
+            </a:r>
+            <a:r>
+              <a:rPr lang="en-US" sz="1800" b="1" dirty="0">
+                <a:solidFill>
+                  <a:srgbClr val="000080"/>
+                </a:solidFill>
+                <a:latin typeface="Menlo"/>
+              </a:rPr>
+              <a:t>new </a:t>
+            </a:r>
+            <a:r>
+              <a:rPr lang="en-US" sz="1800" dirty="0">
+                <a:solidFill>
+                  <a:srgbClr val="000000"/>
+                </a:solidFill>
+                <a:latin typeface="Menlo"/>
+              </a:rPr>
+              <a:t>Tuple2&lt;String, Integer&gt;(word, count));</a:t>
+            </a:r>
+            <a:br>
+              <a:rPr lang="en-US" sz="1800" dirty="0">
+                <a:solidFill>
+                  <a:srgbClr val="000000"/>
+                </a:solidFill>
+                <a:latin typeface="Menlo"/>
+              </a:rPr>
+            </a:br>
+            <a:r>
+              <a:rPr lang="en-US" sz="1800" dirty="0" smtClean="0">
+                <a:solidFill>
+                  <a:srgbClr val="000000"/>
+                </a:solidFill>
+                <a:latin typeface="Menlo"/>
+              </a:rPr>
+              <a:t>    </a:t>
+            </a:r>
+            <a:r>
+              <a:rPr lang="en-US" sz="1800" dirty="0" smtClean="0">
+                <a:solidFill>
+                  <a:srgbClr val="000000"/>
+                </a:solidFill>
+                <a:latin typeface="Menlo"/>
+              </a:rPr>
+              <a:t>}</a:t>
+            </a:r>
+            <a:r>
+              <a:rPr lang="en-US" sz="1800" dirty="0">
+                <a:solidFill>
+                  <a:srgbClr val="000000"/>
+                </a:solidFill>
+                <a:latin typeface="Menlo"/>
+              </a:rPr>
+              <a:t/>
             </a:r>
             <a:br>
               <a:rPr lang="en-US" sz="1800" dirty="0">
@@ -15695,288 +16412,14 @@
                 </a:solidFill>
                 <a:latin typeface="Menlo"/>
               </a:rPr>
-              <a:t>        </a:t>
-            </a:r>
-            <a:r>
-              <a:rPr lang="en-US" sz="1800" b="1" dirty="0" err="1">
-                <a:solidFill>
-                  <a:srgbClr val="000080"/>
-                </a:solidFill>
-                <a:latin typeface="Menlo"/>
-              </a:rPr>
-              <a:t>int</a:t>
-            </a:r>
-            <a:r>
-              <a:rPr lang="en-US" sz="1800" b="1" dirty="0">
-                <a:solidFill>
-                  <a:srgbClr val="000080"/>
-                </a:solidFill>
-                <a:latin typeface="Menlo"/>
-              </a:rPr>
-              <a:t> </a:t>
-            </a:r>
-            <a:r>
-              <a:rPr lang="en-US" sz="1800" dirty="0">
-                <a:solidFill>
-                  <a:srgbClr val="000000"/>
-                </a:solidFill>
-                <a:latin typeface="Menlo"/>
-              </a:rPr>
-              <a:t>count = </a:t>
-            </a:r>
-            <a:r>
-              <a:rPr lang="en-US" sz="1800" dirty="0">
-                <a:solidFill>
-                  <a:srgbClr val="0000FF"/>
-                </a:solidFill>
-                <a:latin typeface="Menlo"/>
-              </a:rPr>
-              <a:t>0</a:t>
-            </a:r>
-            <a:r>
-              <a:rPr lang="en-US" sz="1800" dirty="0">
-                <a:solidFill>
-                  <a:srgbClr val="000000"/>
-                </a:solidFill>
-                <a:latin typeface="Menlo"/>
-              </a:rPr>
-              <a:t>;</a:t>
-            </a:r>
-            <a:br>
-              <a:rPr lang="en-US" sz="1800" dirty="0">
-                <a:solidFill>
-                  <a:srgbClr val="000000"/>
-                </a:solidFill>
-                <a:latin typeface="Menlo"/>
-              </a:rPr>
-            </a:br>
-            <a:r>
-              <a:rPr lang="en-US" sz="1800" dirty="0">
-                <a:solidFill>
-                  <a:srgbClr val="000000"/>
-                </a:solidFill>
-                <a:latin typeface="Menlo"/>
-              </a:rPr>
-              <a:t>        String word = </a:t>
-            </a:r>
-            <a:r>
-              <a:rPr lang="en-US" sz="1800" b="1" dirty="0">
-                <a:solidFill>
-                  <a:srgbClr val="000080"/>
-                </a:solidFill>
-                <a:latin typeface="Menlo"/>
-              </a:rPr>
-              <a:t>null</a:t>
-            </a:r>
-            <a:r>
-              <a:rPr lang="en-US" sz="1800" dirty="0">
-                <a:solidFill>
-                  <a:srgbClr val="000000"/>
-                </a:solidFill>
-                <a:latin typeface="Menlo"/>
-              </a:rPr>
-              <a:t>;</a:t>
-            </a:r>
-            <a:br>
-              <a:rPr lang="en-US" sz="1800" dirty="0">
-                <a:solidFill>
-                  <a:srgbClr val="000000"/>
-                </a:solidFill>
-                <a:latin typeface="Menlo"/>
-              </a:rPr>
-            </a:br>
-            <a:r>
-              <a:rPr lang="en-US" sz="1800" dirty="0">
-                <a:solidFill>
-                  <a:srgbClr val="000000"/>
-                </a:solidFill>
-                <a:latin typeface="Menlo"/>
-              </a:rPr>
-              <a:t>        </a:t>
-            </a:r>
-            <a:r>
-              <a:rPr lang="en-US" sz="1800" b="1" dirty="0">
-                <a:solidFill>
-                  <a:srgbClr val="000080"/>
-                </a:solidFill>
-                <a:latin typeface="Menlo"/>
-              </a:rPr>
-              <a:t>for </a:t>
-            </a:r>
-            <a:r>
-              <a:rPr lang="en-US" sz="1800" dirty="0">
-                <a:solidFill>
-                  <a:srgbClr val="000000"/>
-                </a:solidFill>
-                <a:latin typeface="Menlo"/>
-              </a:rPr>
-              <a:t>(Tuple2&lt;String, Integer&gt; tuple : values) {</a:t>
-            </a:r>
-            <a:br>
-              <a:rPr lang="en-US" sz="1800" dirty="0">
-                <a:solidFill>
-                  <a:srgbClr val="000000"/>
-                </a:solidFill>
-                <a:latin typeface="Menlo"/>
-              </a:rPr>
-            </a:br>
-            <a:r>
-              <a:rPr lang="en-US" sz="1800" dirty="0">
-                <a:solidFill>
-                  <a:srgbClr val="000000"/>
-                </a:solidFill>
-                <a:latin typeface="Menlo"/>
-              </a:rPr>
-              <a:t>            word = tuple.</a:t>
-            </a:r>
-            <a:r>
-              <a:rPr lang="en-US" sz="1800" b="1" dirty="0">
-                <a:solidFill>
-                  <a:srgbClr val="660E7A"/>
-                </a:solidFill>
-                <a:latin typeface="Menlo"/>
-              </a:rPr>
-              <a:t>f0</a:t>
-            </a:r>
-            <a:r>
-              <a:rPr lang="en-US" sz="1800" dirty="0">
-                <a:solidFill>
-                  <a:srgbClr val="000000"/>
-                </a:solidFill>
-                <a:latin typeface="Menlo"/>
-              </a:rPr>
-              <a:t>;</a:t>
-            </a:r>
-            <a:br>
-              <a:rPr lang="en-US" sz="1800" dirty="0">
-                <a:solidFill>
-                  <a:srgbClr val="000000"/>
-                </a:solidFill>
-                <a:latin typeface="Menlo"/>
-              </a:rPr>
-            </a:br>
-            <a:r>
-              <a:rPr lang="en-US" sz="1800" dirty="0">
-                <a:solidFill>
-                  <a:srgbClr val="000000"/>
-                </a:solidFill>
-                <a:latin typeface="Menlo"/>
-              </a:rPr>
-              <a:t>            count++;</a:t>
-            </a:r>
-            <a:br>
-              <a:rPr lang="en-US" sz="1800" dirty="0">
-                <a:solidFill>
-                  <a:srgbClr val="000000"/>
-                </a:solidFill>
-                <a:latin typeface="Menlo"/>
-              </a:rPr>
-            </a:br>
-            <a:r>
-              <a:rPr lang="en-US" sz="1800" dirty="0">
-                <a:solidFill>
-                  <a:srgbClr val="000000"/>
-                </a:solidFill>
-                <a:latin typeface="Menlo"/>
-              </a:rPr>
-              <a:t>        }</a:t>
-            </a:r>
-            <a:br>
-              <a:rPr lang="en-US" sz="1800" dirty="0">
-                <a:solidFill>
-                  <a:srgbClr val="000000"/>
-                </a:solidFill>
-                <a:latin typeface="Menlo"/>
-              </a:rPr>
-            </a:br>
-            <a:r>
-              <a:rPr lang="en-US" sz="1800" dirty="0">
-                <a:solidFill>
-                  <a:srgbClr val="000000"/>
-                </a:solidFill>
-                <a:latin typeface="Menlo"/>
-              </a:rPr>
-              <a:t>        </a:t>
-            </a:r>
-            <a:r>
-              <a:rPr lang="en-US" sz="1800" dirty="0" err="1">
-                <a:solidFill>
-                  <a:srgbClr val="000000"/>
-                </a:solidFill>
-                <a:latin typeface="Menlo"/>
-              </a:rPr>
-              <a:t>out.collect</a:t>
-            </a:r>
-            <a:r>
-              <a:rPr lang="en-US" sz="1800" dirty="0">
-                <a:solidFill>
-                  <a:srgbClr val="000000"/>
-                </a:solidFill>
-                <a:latin typeface="Menlo"/>
-              </a:rPr>
-              <a:t>(</a:t>
-            </a:r>
-            <a:r>
-              <a:rPr lang="en-US" sz="1800" b="1" dirty="0">
-                <a:solidFill>
-                  <a:srgbClr val="000080"/>
-                </a:solidFill>
-                <a:latin typeface="Menlo"/>
-              </a:rPr>
-              <a:t>new </a:t>
-            </a:r>
-            <a:r>
-              <a:rPr lang="en-US" sz="1800" dirty="0">
-                <a:solidFill>
-                  <a:srgbClr val="000000"/>
-                </a:solidFill>
-                <a:latin typeface="Menlo"/>
-              </a:rPr>
-              <a:t>Tuple2&lt;String, Integer&gt;(word, count));</a:t>
-            </a:r>
-            <a:br>
-              <a:rPr lang="en-US" sz="1800" dirty="0">
-                <a:solidFill>
-                  <a:srgbClr val="000000"/>
-                </a:solidFill>
-                <a:latin typeface="Menlo"/>
-              </a:rPr>
-            </a:br>
-            <a:r>
-              <a:rPr lang="en-US" sz="1800" dirty="0" smtClean="0">
-                <a:solidFill>
-                  <a:srgbClr val="000000"/>
-                </a:solidFill>
-                <a:latin typeface="Menlo"/>
-              </a:rPr>
-              <a:t>    </a:t>
-            </a:r>
-            <a:r>
-              <a:rPr lang="en-US" sz="1800" dirty="0">
-                <a:solidFill>
-                  <a:srgbClr val="000000"/>
-                </a:solidFill>
-                <a:latin typeface="Menlo"/>
-              </a:rPr>
               <a:t>}</a:t>
             </a:r>
-            <a:br>
-              <a:rPr lang="en-US" sz="1800" dirty="0">
-                <a:solidFill>
-                  <a:srgbClr val="000000"/>
-                </a:solidFill>
-                <a:latin typeface="Menlo"/>
-              </a:rPr>
-            </a:br>
-            <a:r>
-              <a:rPr lang="en-US" sz="1800" dirty="0">
-                <a:solidFill>
-                  <a:srgbClr val="000000"/>
-                </a:solidFill>
-                <a:latin typeface="Menlo"/>
-              </a:rPr>
-              <a:t>}</a:t>
-            </a:r>
+            <a:endParaRPr lang="en-US" sz="1800" dirty="0">
+              <a:solidFill>
+                <a:srgbClr val="000000"/>
+              </a:solidFill>
+              <a:latin typeface="Menlo"/>
+            </a:endParaRPr>
           </a:p>
         </p:txBody>
       </p:sp>

</xml_diff>